<commit_message>
small changes to Week 5 lab PPT
</commit_message>
<xml_diff>
--- a/Week 5 -- 1D spatial models/Lab/Lab 5 -- 1D spatial models with unequal distances.pptx
+++ b/Week 5 -- 1D spatial models/Lab/Lab 5 -- 1D spatial models with unequal distances.pptx
@@ -5,22 +5,25 @@
     <p:sldMasterId id="2147483672" r:id="rId1"/>
   </p:sldMasterIdLst>
   <p:notesMasterIdLst>
-    <p:notesMasterId r:id="rId15"/>
+    <p:notesMasterId r:id="rId18"/>
   </p:notesMasterIdLst>
   <p:sldIdLst>
     <p:sldId id="266" r:id="rId2"/>
     <p:sldId id="321" r:id="rId3"/>
-    <p:sldId id="311" r:id="rId4"/>
-    <p:sldId id="317" r:id="rId5"/>
-    <p:sldId id="312" r:id="rId6"/>
-    <p:sldId id="313" r:id="rId7"/>
-    <p:sldId id="314" r:id="rId8"/>
-    <p:sldId id="315" r:id="rId9"/>
-    <p:sldId id="316" r:id="rId10"/>
-    <p:sldId id="318" r:id="rId11"/>
-    <p:sldId id="319" r:id="rId12"/>
-    <p:sldId id="322" r:id="rId13"/>
-    <p:sldId id="320" r:id="rId14"/>
+    <p:sldId id="324" r:id="rId4"/>
+    <p:sldId id="311" r:id="rId5"/>
+    <p:sldId id="317" r:id="rId6"/>
+    <p:sldId id="312" r:id="rId7"/>
+    <p:sldId id="325" r:id="rId8"/>
+    <p:sldId id="313" r:id="rId9"/>
+    <p:sldId id="314" r:id="rId10"/>
+    <p:sldId id="315" r:id="rId11"/>
+    <p:sldId id="316" r:id="rId12"/>
+    <p:sldId id="323" r:id="rId13"/>
+    <p:sldId id="318" r:id="rId14"/>
+    <p:sldId id="319" r:id="rId15"/>
+    <p:sldId id="322" r:id="rId16"/>
+    <p:sldId id="320" r:id="rId17"/>
   </p:sldIdLst>
   <p:sldSz cx="9144000" cy="6858000" type="screen4x3"/>
   <p:notesSz cx="6858000" cy="9144000"/>
@@ -209,7 +212,7 @@
           <a:p>
             <a:fld id="{1522831B-4FE3-4D45-950B-0D2C6BB2DD76}" type="datetimeFigureOut">
               <a:rPr lang="en-US" smtClean="0"/>
-              <a:t>4/23/2018</a:t>
+              <a:t>4/26/2018</a:t>
             </a:fld>
             <a:endParaRPr lang="en-US"/>
           </a:p>
@@ -3477,11 +3480,7 @@
           <a:p>
             <a:r>
               <a:rPr lang="en-US" dirty="0" smtClean="0"/>
-              <a:t>April </a:t>
-            </a:r>
-            <a:r>
-              <a:rPr lang="en-US" dirty="0" smtClean="0"/>
-              <a:t>26, 2018</a:t>
+              <a:t>April 26, 2018</a:t>
             </a:r>
             <a:endParaRPr lang="en-US" dirty="0"/>
           </a:p>
@@ -3532,6 +3531,343 @@
 </file>
 
 <file path=ppt/slides/slide10.xml><?xml version="1.0" encoding="utf-8"?>
+<p:sld xmlns:a="http://schemas.openxmlformats.org/drawingml/2006/main" xmlns:r="http://schemas.openxmlformats.org/officeDocument/2006/relationships" xmlns:p="http://schemas.openxmlformats.org/presentationml/2006/main">
+  <p:cSld>
+    <p:spTree>
+      <p:nvGrpSpPr>
+        <p:cNvPr id="1" name=""/>
+        <p:cNvGrpSpPr/>
+        <p:nvPr/>
+      </p:nvGrpSpPr>
+      <p:grpSpPr>
+        <a:xfrm>
+          <a:off x="0" y="0"/>
+          <a:ext cx="0" cy="0"/>
+          <a:chOff x="0" y="0"/>
+          <a:chExt cx="0" cy="0"/>
+        </a:xfrm>
+      </p:grpSpPr>
+      <p:sp>
+        <p:nvSpPr>
+          <p:cNvPr id="2" name="Title 1"/>
+          <p:cNvSpPr>
+            <a:spLocks noGrp="1"/>
+          </p:cNvSpPr>
+          <p:nvPr>
+            <p:ph type="title"/>
+          </p:nvPr>
+        </p:nvSpPr>
+        <p:spPr/>
+        <p:txBody>
+          <a:bodyPr/>
+          <a:lstStyle/>
+          <a:p>
+            <a:endParaRPr lang="en-GB"/>
+          </a:p>
+        </p:txBody>
+      </p:sp>
+      <p:sp>
+        <p:nvSpPr>
+          <p:cNvPr id="3" name="Content Placeholder 2"/>
+          <p:cNvSpPr>
+            <a:spLocks noGrp="1"/>
+          </p:cNvSpPr>
+          <p:nvPr>
+            <p:ph idx="1"/>
+          </p:nvPr>
+        </p:nvSpPr>
+        <p:spPr/>
+        <p:txBody>
+          <a:bodyPr/>
+          <a:lstStyle/>
+          <a:p>
+            <a:pPr marL="0" indent="0">
+              <a:buNone/>
+            </a:pPr>
+            <a:endParaRPr lang="en-US" dirty="0" smtClean="0"/>
+          </a:p>
+          <a:p>
+            <a:pPr marL="0" indent="0">
+              <a:buNone/>
+            </a:pPr>
+            <a:endParaRPr lang="en-US" dirty="0"/>
+          </a:p>
+          <a:p>
+            <a:pPr marL="0" indent="0" algn="ctr">
+              <a:buNone/>
+            </a:pPr>
+            <a:endParaRPr lang="en-US" dirty="0" smtClean="0"/>
+          </a:p>
+          <a:p>
+            <a:pPr marL="0" indent="0" algn="ctr">
+              <a:buNone/>
+            </a:pPr>
+            <a:endParaRPr lang="en-US" dirty="0"/>
+          </a:p>
+          <a:p>
+            <a:pPr marL="0" indent="0" algn="ctr">
+              <a:buNone/>
+            </a:pPr>
+            <a:r>
+              <a:rPr lang="en-US" dirty="0" smtClean="0"/>
+              <a:t>[Show R and TMB code for 2 ways to code this]</a:t>
+            </a:r>
+            <a:endParaRPr lang="en-GB" dirty="0"/>
+          </a:p>
+        </p:txBody>
+      </p:sp>
+    </p:spTree>
+    <p:extLst>
+      <p:ext uri="{BB962C8B-B14F-4D97-AF65-F5344CB8AC3E}">
+        <p14:creationId xmlns:p14="http://schemas.microsoft.com/office/powerpoint/2010/main" val="2953693310"/>
+      </p:ext>
+    </p:extLst>
+  </p:cSld>
+  <p:clrMapOvr>
+    <a:masterClrMapping/>
+  </p:clrMapOvr>
+  <p:timing>
+    <p:tnLst>
+      <p:par>
+        <p:cTn id="1" dur="indefinite" restart="never" nodeType="tmRoot"/>
+      </p:par>
+    </p:tnLst>
+  </p:timing>
+</p:sld>
+</file>
+
+<file path=ppt/slides/slide11.xml><?xml version="1.0" encoding="utf-8"?>
+<p:sld xmlns:a="http://schemas.openxmlformats.org/drawingml/2006/main" xmlns:r="http://schemas.openxmlformats.org/officeDocument/2006/relationships" xmlns:p="http://schemas.openxmlformats.org/presentationml/2006/main">
+  <p:cSld>
+    <p:spTree>
+      <p:nvGrpSpPr>
+        <p:cNvPr id="1" name=""/>
+        <p:cNvGrpSpPr/>
+        <p:nvPr/>
+      </p:nvGrpSpPr>
+      <p:grpSpPr>
+        <a:xfrm>
+          <a:off x="0" y="0"/>
+          <a:ext cx="0" cy="0"/>
+          <a:chOff x="0" y="0"/>
+          <a:chExt cx="0" cy="0"/>
+        </a:xfrm>
+      </p:grpSpPr>
+      <p:sp>
+        <p:nvSpPr>
+          <p:cNvPr id="2" name="Title 1"/>
+          <p:cNvSpPr>
+            <a:spLocks noGrp="1"/>
+          </p:cNvSpPr>
+          <p:nvPr>
+            <p:ph type="title"/>
+          </p:nvPr>
+        </p:nvSpPr>
+        <p:spPr/>
+        <p:txBody>
+          <a:bodyPr/>
+          <a:lstStyle/>
+          <a:p>
+            <a:endParaRPr lang="en-GB"/>
+          </a:p>
+        </p:txBody>
+      </p:sp>
+      <p:sp>
+        <p:nvSpPr>
+          <p:cNvPr id="3" name="Content Placeholder 2"/>
+          <p:cNvSpPr>
+            <a:spLocks noGrp="1"/>
+          </p:cNvSpPr>
+          <p:nvPr>
+            <p:ph idx="1"/>
+          </p:nvPr>
+        </p:nvSpPr>
+        <p:spPr/>
+        <p:txBody>
+          <a:bodyPr/>
+          <a:lstStyle/>
+          <a:p>
+            <a:pPr marL="0" indent="0">
+              <a:buNone/>
+            </a:pPr>
+            <a:r>
+              <a:rPr lang="en-US" dirty="0" smtClean="0"/>
+              <a:t>Lessons:</a:t>
+            </a:r>
+          </a:p>
+          <a:p>
+            <a:pPr marL="514350" indent="-514350">
+              <a:buFont typeface="+mj-lt"/>
+              <a:buAutoNum type="arabicPeriod"/>
+            </a:pPr>
+            <a:r>
+              <a:rPr lang="en-US" dirty="0" smtClean="0"/>
+              <a:t>Speed</a:t>
+            </a:r>
+          </a:p>
+          <a:p>
+            <a:pPr lvl="1" indent="-342900"/>
+            <a:r>
+              <a:rPr lang="en-US" dirty="0" smtClean="0"/>
+              <a:t>Again, stochastic is easier than covariance-based calculation</a:t>
+            </a:r>
+          </a:p>
+          <a:p>
+            <a:pPr lvl="1" indent="-342900"/>
+            <a:r>
+              <a:rPr lang="en-US" dirty="0" smtClean="0"/>
+              <a:t>Avoids need to assemble covariance matrix</a:t>
+            </a:r>
+          </a:p>
+          <a:p>
+            <a:pPr marL="514350" indent="-514350">
+              <a:buFont typeface="+mj-lt"/>
+              <a:buAutoNum type="arabicPeriod"/>
+            </a:pPr>
+            <a:r>
+              <a:rPr lang="en-US" dirty="0" smtClean="0"/>
+              <a:t>Unequal-interval models generalize the equal-interval models</a:t>
+            </a:r>
+          </a:p>
+          <a:p>
+            <a:pPr lvl="1" indent="-342900"/>
+            <a:r>
+              <a:rPr lang="en-US" dirty="0" smtClean="0"/>
+              <a:t>Generally true that continuous treatment generalizes discrete treatment</a:t>
+            </a:r>
+          </a:p>
+        </p:txBody>
+      </p:sp>
+    </p:spTree>
+    <p:extLst>
+      <p:ext uri="{BB962C8B-B14F-4D97-AF65-F5344CB8AC3E}">
+        <p14:creationId xmlns:p14="http://schemas.microsoft.com/office/powerpoint/2010/main" val="2197743423"/>
+      </p:ext>
+    </p:extLst>
+  </p:cSld>
+  <p:clrMapOvr>
+    <a:masterClrMapping/>
+  </p:clrMapOvr>
+  <p:timing>
+    <p:tnLst>
+      <p:par>
+        <p:cTn id="1" dur="indefinite" restart="never" nodeType="tmRoot"/>
+      </p:par>
+    </p:tnLst>
+  </p:timing>
+</p:sld>
+</file>
+
+<file path=ppt/slides/slide12.xml><?xml version="1.0" encoding="utf-8"?>
+<p:sld xmlns:a="http://schemas.openxmlformats.org/drawingml/2006/main" xmlns:r="http://schemas.openxmlformats.org/officeDocument/2006/relationships" xmlns:p="http://schemas.openxmlformats.org/presentationml/2006/main">
+  <p:cSld>
+    <p:spTree>
+      <p:nvGrpSpPr>
+        <p:cNvPr id="1" name=""/>
+        <p:cNvGrpSpPr/>
+        <p:nvPr/>
+      </p:nvGrpSpPr>
+      <p:grpSpPr>
+        <a:xfrm>
+          <a:off x="0" y="0"/>
+          <a:ext cx="0" cy="0"/>
+          <a:chOff x="0" y="0"/>
+          <a:chExt cx="0" cy="0"/>
+        </a:xfrm>
+      </p:grpSpPr>
+      <p:sp>
+        <p:nvSpPr>
+          <p:cNvPr id="2" name="Title 1"/>
+          <p:cNvSpPr>
+            <a:spLocks noGrp="1"/>
+          </p:cNvSpPr>
+          <p:nvPr>
+            <p:ph type="title"/>
+          </p:nvPr>
+        </p:nvSpPr>
+        <p:spPr/>
+        <p:txBody>
+          <a:bodyPr/>
+          <a:lstStyle/>
+          <a:p>
+            <a:endParaRPr lang="en-GB"/>
+          </a:p>
+        </p:txBody>
+      </p:sp>
+      <p:sp>
+        <p:nvSpPr>
+          <p:cNvPr id="3" name="Content Placeholder 2"/>
+          <p:cNvSpPr>
+            <a:spLocks noGrp="1"/>
+          </p:cNvSpPr>
+          <p:nvPr>
+            <p:ph idx="1"/>
+          </p:nvPr>
+        </p:nvSpPr>
+        <p:spPr/>
+        <p:txBody>
+          <a:bodyPr/>
+          <a:lstStyle/>
+          <a:p>
+            <a:pPr marL="0" indent="0">
+              <a:buNone/>
+            </a:pPr>
+            <a:r>
+              <a:rPr lang="en-US" dirty="0" smtClean="0"/>
+              <a:t>When else does </a:t>
+            </a:r>
+            <a:r>
+              <a:rPr lang="en-US" dirty="0" err="1"/>
+              <a:t>s</a:t>
+            </a:r>
+            <a:r>
+              <a:rPr lang="en-US" dirty="0" err="1" smtClean="0"/>
+              <a:t>eparability</a:t>
+            </a:r>
+            <a:r>
+              <a:rPr lang="en-US" dirty="0" smtClean="0"/>
+              <a:t> break down?</a:t>
+            </a:r>
+          </a:p>
+          <a:p>
+            <a:pPr marL="0" indent="0">
+              <a:buNone/>
+            </a:pPr>
+            <a:endParaRPr lang="en-US" dirty="0"/>
+          </a:p>
+          <a:p>
+            <a:pPr marL="0" indent="0">
+              <a:buNone/>
+            </a:pPr>
+            <a:r>
+              <a:rPr lang="en-US" dirty="0" smtClean="0"/>
+              <a:t>[Exercise: Compare version 2 for the exponential covariance function with a new covariance function, and inspect the Hessian for each]</a:t>
+            </a:r>
+            <a:endParaRPr lang="en-US" dirty="0" smtClean="0"/>
+          </a:p>
+        </p:txBody>
+      </p:sp>
+    </p:spTree>
+    <p:extLst>
+      <p:ext uri="{BB962C8B-B14F-4D97-AF65-F5344CB8AC3E}">
+        <p14:creationId xmlns:p14="http://schemas.microsoft.com/office/powerpoint/2010/main" val="2971626783"/>
+      </p:ext>
+    </p:extLst>
+  </p:cSld>
+  <p:clrMapOvr>
+    <a:masterClrMapping/>
+  </p:clrMapOvr>
+  <p:timing>
+    <p:tnLst>
+      <p:par>
+        <p:cTn id="1" dur="indefinite" restart="never" nodeType="tmRoot"/>
+      </p:par>
+    </p:tnLst>
+  </p:timing>
+</p:sld>
+</file>
+
+<file path=ppt/slides/slide13.xml><?xml version="1.0" encoding="utf-8"?>
 <p:sld xmlns:a="http://schemas.openxmlformats.org/drawingml/2006/main" xmlns:r="http://schemas.openxmlformats.org/officeDocument/2006/relationships" xmlns:p="http://schemas.openxmlformats.org/presentationml/2006/main">
   <p:cSld>
     <p:spTree>
@@ -4099,7 +4435,7 @@
 </p:sld>
 </file>
 
-<file path=ppt/slides/slide11.xml><?xml version="1.0" encoding="utf-8"?>
+<file path=ppt/slides/slide14.xml><?xml version="1.0" encoding="utf-8"?>
 <p:sld xmlns:a="http://schemas.openxmlformats.org/drawingml/2006/main" xmlns:r="http://schemas.openxmlformats.org/officeDocument/2006/relationships" xmlns:p="http://schemas.openxmlformats.org/presentationml/2006/main">
   <p:cSld>
     <p:spTree>
@@ -4660,7 +4996,7 @@
 </p:sld>
 </file>
 
-<file path=ppt/slides/slide12.xml><?xml version="1.0" encoding="utf-8"?>
+<file path=ppt/slides/slide15.xml><?xml version="1.0" encoding="utf-8"?>
 <p:sld xmlns:a="http://schemas.openxmlformats.org/drawingml/2006/main" xmlns:r="http://schemas.openxmlformats.org/officeDocument/2006/relationships" xmlns:p="http://schemas.openxmlformats.org/presentationml/2006/main">
   <p:cSld>
     <p:spTree>
@@ -5414,7 +5750,7 @@
 </p:sld>
 </file>
 
-<file path=ppt/slides/slide13.xml><?xml version="1.0" encoding="utf-8"?>
+<file path=ppt/slides/slide16.xml><?xml version="1.0" encoding="utf-8"?>
 <p:sld xmlns:a="http://schemas.openxmlformats.org/drawingml/2006/main" xmlns:r="http://schemas.openxmlformats.org/officeDocument/2006/relationships" xmlns:p="http://schemas.openxmlformats.org/presentationml/2006/main">
   <p:cSld>
     <p:spTree>
@@ -7000,6 +7336,527 @@
           </a:p>
         </p:txBody>
       </p:sp>
+      <mc:AlternateContent xmlns:mc="http://schemas.openxmlformats.org/markup-compatibility/2006">
+        <mc:Choice xmlns:a14="http://schemas.microsoft.com/office/drawing/2010/main" Requires="a14">
+          <p:sp>
+            <p:nvSpPr>
+              <p:cNvPr id="3" name="Content Placeholder 2"/>
+              <p:cNvSpPr>
+                <a:spLocks noGrp="1"/>
+              </p:cNvSpPr>
+              <p:nvPr>
+                <p:ph idx="1"/>
+              </p:nvPr>
+            </p:nvSpPr>
+            <p:spPr/>
+            <p:txBody>
+              <a:bodyPr/>
+              <a:lstStyle/>
+              <a:p>
+                <a:pPr marL="0" indent="0">
+                  <a:buNone/>
+                </a:pPr>
+                <a:r>
+                  <a:rPr lang="en-US" b="1" dirty="0" smtClean="0"/>
+                  <a:t>Review</a:t>
+                </a:r>
+                <a:r>
+                  <a:rPr lang="en-US" dirty="0" smtClean="0"/>
+                  <a:t>:  Equal </a:t>
+                </a:r>
+                <a:r>
+                  <a:rPr lang="en-US" dirty="0" smtClean="0"/>
+                  <a:t>distance </a:t>
+                </a:r>
+                <a:r>
+                  <a:rPr lang="en-US" dirty="0" err="1" smtClean="0"/>
+                  <a:t>autoregression</a:t>
+                </a:r>
+                <a:endParaRPr lang="en-US" dirty="0" smtClean="0"/>
+              </a:p>
+              <a:p>
+                <a:pPr marL="0" indent="0">
+                  <a:buNone/>
+                </a:pPr>
+                <a14:m>
+                  <m:oMathPara xmlns:m="http://schemas.openxmlformats.org/officeDocument/2006/math">
+                    <m:oMathParaPr>
+                      <m:jc m:val="centerGroup"/>
+                    </m:oMathParaPr>
+                    <m:oMath xmlns:m="http://schemas.openxmlformats.org/officeDocument/2006/math">
+                      <m:r>
+                        <a:rPr lang="en-US" i="1">
+                          <a:latin typeface="Cambria Math" panose="02040503050406030204" pitchFamily="18" charset="0"/>
+                          <a:ea typeface="Cambria Math" panose="02040503050406030204" pitchFamily="18" charset="0"/>
+                        </a:rPr>
+                        <m:t>𝑐</m:t>
+                      </m:r>
+                      <m:r>
+                        <a:rPr lang="en-US" i="1">
+                          <a:latin typeface="Cambria Math" panose="02040503050406030204" pitchFamily="18" charset="0"/>
+                          <a:ea typeface="Cambria Math" panose="02040503050406030204" pitchFamily="18" charset="0"/>
+                        </a:rPr>
+                        <m:t>(</m:t>
+                      </m:r>
+                      <m:r>
+                        <a:rPr lang="en-US" i="1">
+                          <a:latin typeface="Cambria Math" panose="02040503050406030204" pitchFamily="18" charset="0"/>
+                          <a:ea typeface="Cambria Math" panose="02040503050406030204" pitchFamily="18" charset="0"/>
+                        </a:rPr>
+                        <m:t>𝑠</m:t>
+                      </m:r>
+                      <m:r>
+                        <a:rPr lang="en-US" i="1">
+                          <a:latin typeface="Cambria Math" panose="02040503050406030204" pitchFamily="18" charset="0"/>
+                          <a:ea typeface="Cambria Math" panose="02040503050406030204" pitchFamily="18" charset="0"/>
+                        </a:rPr>
+                        <m:t>)~</m:t>
+                      </m:r>
+                      <m:r>
+                        <a:rPr lang="en-US" i="1">
+                          <a:latin typeface="Cambria Math" panose="02040503050406030204" pitchFamily="18" charset="0"/>
+                          <a:ea typeface="Cambria Math" panose="02040503050406030204" pitchFamily="18" charset="0"/>
+                        </a:rPr>
+                        <m:t>𝑔</m:t>
+                      </m:r>
+                      <m:d>
+                        <m:dPr>
+                          <m:ctrlPr>
+                            <a:rPr lang="en-US" i="1">
+                              <a:latin typeface="Cambria Math" panose="02040503050406030204" pitchFamily="18" charset="0"/>
+                              <a:ea typeface="Cambria Math" panose="02040503050406030204" pitchFamily="18" charset="0"/>
+                            </a:rPr>
+                          </m:ctrlPr>
+                        </m:dPr>
+                        <m:e>
+                          <m:r>
+                            <a:rPr lang="en-US" i="1">
+                              <a:latin typeface="Cambria Math" panose="02040503050406030204" pitchFamily="18" charset="0"/>
+                              <a:ea typeface="Cambria Math" panose="02040503050406030204" pitchFamily="18" charset="0"/>
+                            </a:rPr>
+                            <m:t>𝜇</m:t>
+                          </m:r>
+                          <m:r>
+                            <a:rPr lang="en-US" i="1">
+                              <a:latin typeface="Cambria Math" panose="02040503050406030204" pitchFamily="18" charset="0"/>
+                              <a:ea typeface="Cambria Math" panose="02040503050406030204" pitchFamily="18" charset="0"/>
+                            </a:rPr>
+                            <m:t>(</m:t>
+                          </m:r>
+                          <m:r>
+                            <a:rPr lang="en-US" i="1">
+                              <a:latin typeface="Cambria Math" panose="02040503050406030204" pitchFamily="18" charset="0"/>
+                              <a:ea typeface="Cambria Math" panose="02040503050406030204" pitchFamily="18" charset="0"/>
+                            </a:rPr>
+                            <m:t>𝑠</m:t>
+                          </m:r>
+                          <m:r>
+                            <a:rPr lang="en-US" i="1">
+                              <a:latin typeface="Cambria Math" panose="02040503050406030204" pitchFamily="18" charset="0"/>
+                              <a:ea typeface="Cambria Math" panose="02040503050406030204" pitchFamily="18" charset="0"/>
+                            </a:rPr>
+                            <m:t>)</m:t>
+                          </m:r>
+                        </m:e>
+                      </m:d>
+                    </m:oMath>
+                  </m:oMathPara>
+                </a14:m>
+                <a:endParaRPr lang="en-US" dirty="0"/>
+              </a:p>
+              <a:p>
+                <a:pPr marL="0" indent="0">
+                  <a:buNone/>
+                </a:pPr>
+                <a14:m>
+                  <m:oMathPara xmlns:m="http://schemas.openxmlformats.org/officeDocument/2006/math">
+                    <m:oMathParaPr>
+                      <m:jc m:val="centerGroup"/>
+                    </m:oMathParaPr>
+                    <m:oMath xmlns:m="http://schemas.openxmlformats.org/officeDocument/2006/math">
+                      <m:r>
+                        <a:rPr lang="en-US" i="1">
+                          <a:latin typeface="Cambria Math" panose="02040503050406030204" pitchFamily="18" charset="0"/>
+                          <a:ea typeface="Cambria Math" panose="02040503050406030204" pitchFamily="18" charset="0"/>
+                        </a:rPr>
+                        <m:t>𝜇</m:t>
+                      </m:r>
+                      <m:d>
+                        <m:dPr>
+                          <m:ctrlPr>
+                            <a:rPr lang="en-US" i="1">
+                              <a:latin typeface="Cambria Math" panose="02040503050406030204" pitchFamily="18" charset="0"/>
+                              <a:ea typeface="Cambria Math" panose="02040503050406030204" pitchFamily="18" charset="0"/>
+                            </a:rPr>
+                          </m:ctrlPr>
+                        </m:dPr>
+                        <m:e>
+                          <m:r>
+                            <a:rPr lang="en-US" i="1">
+                              <a:latin typeface="Cambria Math" panose="02040503050406030204" pitchFamily="18" charset="0"/>
+                              <a:ea typeface="Cambria Math" panose="02040503050406030204" pitchFamily="18" charset="0"/>
+                            </a:rPr>
+                            <m:t>𝑠</m:t>
+                          </m:r>
+                        </m:e>
+                      </m:d>
+                      <m:r>
+                        <a:rPr lang="en-US" i="1">
+                          <a:latin typeface="Cambria Math" panose="02040503050406030204" pitchFamily="18" charset="0"/>
+                          <a:ea typeface="Cambria Math" panose="02040503050406030204" pitchFamily="18" charset="0"/>
+                        </a:rPr>
+                        <m:t>=</m:t>
+                      </m:r>
+                      <m:r>
+                        <a:rPr lang="en-US" b="1">
+                          <a:latin typeface="Cambria Math" panose="02040503050406030204" pitchFamily="18" charset="0"/>
+                          <a:ea typeface="Cambria Math" panose="02040503050406030204" pitchFamily="18" charset="0"/>
+                        </a:rPr>
+                        <m:t>𝐱</m:t>
+                      </m:r>
+                      <m:r>
+                        <a:rPr lang="en-US">
+                          <a:latin typeface="Cambria Math" panose="02040503050406030204" pitchFamily="18" charset="0"/>
+                          <a:ea typeface="Cambria Math" panose="02040503050406030204" pitchFamily="18" charset="0"/>
+                        </a:rPr>
+                        <m:t>(</m:t>
+                      </m:r>
+                      <m:r>
+                        <a:rPr lang="en-US" i="1">
+                          <a:latin typeface="Cambria Math" panose="02040503050406030204" pitchFamily="18" charset="0"/>
+                          <a:ea typeface="Cambria Math" panose="02040503050406030204" pitchFamily="18" charset="0"/>
+                        </a:rPr>
+                        <m:t>𝑠</m:t>
+                      </m:r>
+                      <m:r>
+                        <a:rPr lang="en-US">
+                          <a:latin typeface="Cambria Math" panose="02040503050406030204" pitchFamily="18" charset="0"/>
+                          <a:ea typeface="Cambria Math" panose="02040503050406030204" pitchFamily="18" charset="0"/>
+                        </a:rPr>
+                        <m:t>)</m:t>
+                      </m:r>
+                      <m:r>
+                        <a:rPr lang="en-US" b="1">
+                          <a:latin typeface="Cambria Math" panose="02040503050406030204" pitchFamily="18" charset="0"/>
+                          <a:ea typeface="Cambria Math" panose="02040503050406030204" pitchFamily="18" charset="0"/>
+                        </a:rPr>
+                        <m:t>𝛃</m:t>
+                      </m:r>
+                      <m:r>
+                        <a:rPr lang="en-US" b="1">
+                          <a:latin typeface="Cambria Math" panose="02040503050406030204" pitchFamily="18" charset="0"/>
+                          <a:ea typeface="Cambria Math" panose="02040503050406030204" pitchFamily="18" charset="0"/>
+                        </a:rPr>
+                        <m:t>+</m:t>
+                      </m:r>
+                      <m:r>
+                        <a:rPr lang="en-US" i="1">
+                          <a:latin typeface="Cambria Math" panose="02040503050406030204" pitchFamily="18" charset="0"/>
+                          <a:ea typeface="Cambria Math" panose="02040503050406030204" pitchFamily="18" charset="0"/>
+                        </a:rPr>
+                        <m:t>𝜀</m:t>
+                      </m:r>
+                      <m:r>
+                        <a:rPr lang="en-US" i="1">
+                          <a:latin typeface="Cambria Math" panose="02040503050406030204" pitchFamily="18" charset="0"/>
+                          <a:ea typeface="Cambria Math" panose="02040503050406030204" pitchFamily="18" charset="0"/>
+                        </a:rPr>
+                        <m:t>(</m:t>
+                      </m:r>
+                      <m:r>
+                        <a:rPr lang="en-US" i="1">
+                          <a:latin typeface="Cambria Math" panose="02040503050406030204" pitchFamily="18" charset="0"/>
+                          <a:ea typeface="Cambria Math" panose="02040503050406030204" pitchFamily="18" charset="0"/>
+                        </a:rPr>
+                        <m:t>𝑠</m:t>
+                      </m:r>
+                      <m:r>
+                        <a:rPr lang="en-US" i="1">
+                          <a:latin typeface="Cambria Math" panose="02040503050406030204" pitchFamily="18" charset="0"/>
+                          <a:ea typeface="Cambria Math" panose="02040503050406030204" pitchFamily="18" charset="0"/>
+                        </a:rPr>
+                        <m:t>)</m:t>
+                      </m:r>
+                    </m:oMath>
+                  </m:oMathPara>
+                </a14:m>
+                <a:endParaRPr lang="en-US" b="1" dirty="0"/>
+              </a:p>
+              <a:p>
+                <a:pPr lvl="1"/>
+                <a:r>
+                  <a:rPr lang="en-US" dirty="0" smtClean="0"/>
+                  <a:t>Let’s assume first-order </a:t>
+                </a:r>
+                <a:r>
+                  <a:rPr lang="en-US" dirty="0" err="1" smtClean="0"/>
+                  <a:t>autoregression</a:t>
+                </a:r>
+                <a:r>
+                  <a:rPr lang="en-US" dirty="0" smtClean="0"/>
+                  <a:t>:</a:t>
+                </a:r>
+              </a:p>
+              <a:p>
+                <a:pPr marL="457200" lvl="1" indent="0">
+                  <a:buNone/>
+                </a:pPr>
+                <a14:m>
+                  <m:oMathPara xmlns:m="http://schemas.openxmlformats.org/officeDocument/2006/math">
+                    <m:oMathParaPr>
+                      <m:jc m:val="centerGroup"/>
+                    </m:oMathParaPr>
+                    <m:oMath xmlns:m="http://schemas.openxmlformats.org/officeDocument/2006/math">
+                      <m:r>
+                        <a:rPr lang="en-US" i="1">
+                          <a:latin typeface="Cambria Math" panose="02040503050406030204" pitchFamily="18" charset="0"/>
+                          <a:ea typeface="Cambria Math" panose="02040503050406030204" pitchFamily="18" charset="0"/>
+                        </a:rPr>
+                        <m:t>𝜀</m:t>
+                      </m:r>
+                      <m:r>
+                        <a:rPr lang="en-US" i="1">
+                          <a:latin typeface="Cambria Math" panose="02040503050406030204" pitchFamily="18" charset="0"/>
+                          <a:ea typeface="Cambria Math" panose="02040503050406030204" pitchFamily="18" charset="0"/>
+                        </a:rPr>
+                        <m:t>(</m:t>
+                      </m:r>
+                      <m:r>
+                        <a:rPr lang="en-US" i="1">
+                          <a:latin typeface="Cambria Math" panose="02040503050406030204" pitchFamily="18" charset="0"/>
+                          <a:ea typeface="Cambria Math" panose="02040503050406030204" pitchFamily="18" charset="0"/>
+                        </a:rPr>
+                        <m:t>𝑠</m:t>
+                      </m:r>
+                      <m:r>
+                        <a:rPr lang="en-US" i="1">
+                          <a:latin typeface="Cambria Math" panose="02040503050406030204" pitchFamily="18" charset="0"/>
+                          <a:ea typeface="Cambria Math" panose="02040503050406030204" pitchFamily="18" charset="0"/>
+                        </a:rPr>
+                        <m:t>+1)~</m:t>
+                      </m:r>
+                      <m:r>
+                        <m:rPr>
+                          <m:sty m:val="p"/>
+                        </m:rPr>
+                        <a:rPr lang="en-US">
+                          <a:latin typeface="Cambria Math" panose="02040503050406030204" pitchFamily="18" charset="0"/>
+                          <a:ea typeface="Cambria Math" panose="02040503050406030204" pitchFamily="18" charset="0"/>
+                        </a:rPr>
+                        <m:t>Normal</m:t>
+                      </m:r>
+                      <m:r>
+                        <a:rPr lang="en-US" i="1">
+                          <a:latin typeface="Cambria Math" panose="02040503050406030204" pitchFamily="18" charset="0"/>
+                          <a:ea typeface="Cambria Math" panose="02040503050406030204" pitchFamily="18" charset="0"/>
+                        </a:rPr>
+                        <m:t>(</m:t>
+                      </m:r>
+                      <m:r>
+                        <a:rPr lang="en-US" i="1">
+                          <a:latin typeface="Cambria Math" panose="02040503050406030204" pitchFamily="18" charset="0"/>
+                          <a:ea typeface="Cambria Math" panose="02040503050406030204" pitchFamily="18" charset="0"/>
+                        </a:rPr>
+                        <m:t>𝜌𝜀</m:t>
+                      </m:r>
+                      <m:r>
+                        <a:rPr lang="en-US" i="1">
+                          <a:latin typeface="Cambria Math" panose="02040503050406030204" pitchFamily="18" charset="0"/>
+                          <a:ea typeface="Cambria Math" panose="02040503050406030204" pitchFamily="18" charset="0"/>
+                        </a:rPr>
+                        <m:t>(</m:t>
+                      </m:r>
+                      <m:r>
+                        <a:rPr lang="en-US" i="1">
+                          <a:latin typeface="Cambria Math" panose="02040503050406030204" pitchFamily="18" charset="0"/>
+                          <a:ea typeface="Cambria Math" panose="02040503050406030204" pitchFamily="18" charset="0"/>
+                        </a:rPr>
+                        <m:t>𝑠</m:t>
+                      </m:r>
+                      <m:r>
+                        <a:rPr lang="en-US" i="1">
+                          <a:latin typeface="Cambria Math" panose="02040503050406030204" pitchFamily="18" charset="0"/>
+                          <a:ea typeface="Cambria Math" panose="02040503050406030204" pitchFamily="18" charset="0"/>
+                        </a:rPr>
+                        <m:t>),</m:t>
+                      </m:r>
+                      <m:sSubSup>
+                        <m:sSubSupPr>
+                          <m:ctrlPr>
+                            <a:rPr lang="en-US" i="1">
+                              <a:latin typeface="Cambria Math" panose="02040503050406030204" pitchFamily="18" charset="0"/>
+                              <a:ea typeface="Cambria Math" panose="02040503050406030204" pitchFamily="18" charset="0"/>
+                            </a:rPr>
+                          </m:ctrlPr>
+                        </m:sSubSupPr>
+                        <m:e>
+                          <m:r>
+                            <a:rPr lang="en-US" i="1">
+                              <a:latin typeface="Cambria Math" panose="02040503050406030204" pitchFamily="18" charset="0"/>
+                              <a:ea typeface="Cambria Math" panose="02040503050406030204" pitchFamily="18" charset="0"/>
+                            </a:rPr>
+                            <m:t>𝜎</m:t>
+                          </m:r>
+                        </m:e>
+                        <m:sub>
+                          <m:r>
+                            <a:rPr lang="en-US" i="1">
+                              <a:latin typeface="Cambria Math" panose="02040503050406030204" pitchFamily="18" charset="0"/>
+                              <a:ea typeface="Cambria Math" panose="02040503050406030204" pitchFamily="18" charset="0"/>
+                            </a:rPr>
+                            <m:t>𝜀</m:t>
+                          </m:r>
+                        </m:sub>
+                        <m:sup>
+                          <m:r>
+                            <a:rPr lang="en-US" i="1">
+                              <a:latin typeface="Cambria Math" panose="02040503050406030204" pitchFamily="18" charset="0"/>
+                              <a:ea typeface="Cambria Math" panose="02040503050406030204" pitchFamily="18" charset="0"/>
+                            </a:rPr>
+                            <m:t>2</m:t>
+                          </m:r>
+                        </m:sup>
+                      </m:sSubSup>
+                      <m:r>
+                        <a:rPr lang="en-US" i="1">
+                          <a:latin typeface="Cambria Math" panose="02040503050406030204" pitchFamily="18" charset="0"/>
+                          <a:ea typeface="Cambria Math" panose="02040503050406030204" pitchFamily="18" charset="0"/>
+                        </a:rPr>
+                        <m:t>)</m:t>
+                      </m:r>
+                    </m:oMath>
+                  </m:oMathPara>
+                </a14:m>
+                <a:endParaRPr lang="en-US" dirty="0"/>
+              </a:p>
+              <a:p>
+                <a:pPr marL="0" indent="0">
+                  <a:buNone/>
+                </a:pPr>
+                <a:endParaRPr lang="en-GB" dirty="0"/>
+              </a:p>
+            </p:txBody>
+          </p:sp>
+        </mc:Choice>
+        <mc:Fallback>
+          <p:sp>
+            <p:nvSpPr>
+              <p:cNvPr id="3" name="Content Placeholder 2"/>
+              <p:cNvSpPr>
+                <a:spLocks noGrp="1" noRot="1" noChangeAspect="1" noMove="1" noResize="1" noEditPoints="1" noAdjustHandles="1" noChangeArrowheads="1" noChangeShapeType="1" noTextEdit="1"/>
+              </p:cNvSpPr>
+              <p:nvPr>
+                <p:ph idx="1"/>
+              </p:nvPr>
+            </p:nvSpPr>
+            <p:spPr>
+              <a:blipFill>
+                <a:blip r:embed="rId2"/>
+                <a:stretch>
+                  <a:fillRect l="-1424" t="-1026"/>
+                </a:stretch>
+              </a:blipFill>
+            </p:spPr>
+            <p:txBody>
+              <a:bodyPr/>
+              <a:lstStyle/>
+              <a:p>
+                <a:r>
+                  <a:rPr lang="en-GB">
+                    <a:noFill/>
+                  </a:rPr>
+                  <a:t> </a:t>
+                </a:r>
+              </a:p>
+            </p:txBody>
+          </p:sp>
+        </mc:Fallback>
+      </mc:AlternateContent>
+      <p:pic>
+        <p:nvPicPr>
+          <p:cNvPr id="4" name="Picture 3"/>
+          <p:cNvPicPr>
+            <a:picLocks noChangeAspect="1"/>
+          </p:cNvPicPr>
+          <p:nvPr/>
+        </p:nvPicPr>
+        <p:blipFill rotWithShape="1">
+          <a:blip r:embed="rId3">
+            <a:extLst>
+              <a:ext uri="{28A0092B-C50C-407E-A947-70E740481C1C}">
+                <a14:useLocalDpi xmlns:a14="http://schemas.microsoft.com/office/drawing/2010/main" val="0"/>
+              </a:ext>
+            </a:extLst>
+          </a:blip>
+          <a:srcRect l="174" t="18500" r="1" b="4901"/>
+          <a:stretch/>
+        </p:blipFill>
+        <p:spPr>
+          <a:xfrm>
+            <a:off x="2355495" y="3468054"/>
+            <a:ext cx="4184293" cy="3210724"/>
+          </a:xfrm>
+          <a:prstGeom prst="rect">
+            <a:avLst/>
+          </a:prstGeom>
+        </p:spPr>
+      </p:pic>
+    </p:spTree>
+    <p:extLst>
+      <p:ext uri="{BB962C8B-B14F-4D97-AF65-F5344CB8AC3E}">
+        <p14:creationId xmlns:p14="http://schemas.microsoft.com/office/powerpoint/2010/main" val="390491257"/>
+      </p:ext>
+    </p:extLst>
+  </p:cSld>
+  <p:clrMapOvr>
+    <a:masterClrMapping/>
+  </p:clrMapOvr>
+  <p:timing>
+    <p:tnLst>
+      <p:par>
+        <p:cTn id="1" dur="indefinite" restart="never" nodeType="tmRoot"/>
+      </p:par>
+    </p:tnLst>
+  </p:timing>
+</p:sld>
+</file>
+
+<file path=ppt/slides/slide4.xml><?xml version="1.0" encoding="utf-8"?>
+<p:sld xmlns:a="http://schemas.openxmlformats.org/drawingml/2006/main" xmlns:r="http://schemas.openxmlformats.org/officeDocument/2006/relationships" xmlns:p="http://schemas.openxmlformats.org/presentationml/2006/main">
+  <p:cSld>
+    <p:spTree>
+      <p:nvGrpSpPr>
+        <p:cNvPr id="1" name=""/>
+        <p:cNvGrpSpPr/>
+        <p:nvPr/>
+      </p:nvGrpSpPr>
+      <p:grpSpPr>
+        <a:xfrm>
+          <a:off x="0" y="0"/>
+          <a:ext cx="0" cy="0"/>
+          <a:chOff x="0" y="0"/>
+          <a:chExt cx="0" cy="0"/>
+        </a:xfrm>
+      </p:grpSpPr>
+      <p:sp>
+        <p:nvSpPr>
+          <p:cNvPr id="2" name="Title 1"/>
+          <p:cNvSpPr>
+            <a:spLocks noGrp="1"/>
+          </p:cNvSpPr>
+          <p:nvPr>
+            <p:ph type="title"/>
+          </p:nvPr>
+        </p:nvSpPr>
+        <p:spPr/>
+        <p:txBody>
+          <a:bodyPr/>
+          <a:lstStyle/>
+          <a:p>
+            <a:endParaRPr lang="en-GB"/>
+          </a:p>
+        </p:txBody>
+      </p:sp>
       <p:sp>
         <p:nvSpPr>
           <p:cNvPr id="3" name="Content Placeholder 2"/>
@@ -7052,7 +7909,7 @@
 </p:sld>
 </file>
 
-<file path=ppt/slides/slide4.xml><?xml version="1.0" encoding="utf-8"?>
+<file path=ppt/slides/slide5.xml><?xml version="1.0" encoding="utf-8"?>
 <p:sld xmlns:a="http://schemas.openxmlformats.org/drawingml/2006/main" xmlns:r="http://schemas.openxmlformats.org/officeDocument/2006/relationships" xmlns:p="http://schemas.openxmlformats.org/presentationml/2006/main">
   <p:cSld>
     <p:spTree>
@@ -7169,7 +8026,7 @@
 </p:sld>
 </file>
 
-<file path=ppt/slides/slide5.xml><?xml version="1.0" encoding="utf-8"?>
+<file path=ppt/slides/slide6.xml><?xml version="1.0" encoding="utf-8"?>
 <p:sld xmlns:a="http://schemas.openxmlformats.org/drawingml/2006/main" xmlns:r="http://schemas.openxmlformats.org/officeDocument/2006/relationships" xmlns:p="http://schemas.openxmlformats.org/presentationml/2006/main">
   <p:cSld>
     <p:spTree>
@@ -7205,8 +8062,8 @@
           </a:p>
         </p:txBody>
       </p:sp>
-      <mc:AlternateContent xmlns:mc="http://schemas.openxmlformats.org/markup-compatibility/2006" xmlns:a14="http://schemas.microsoft.com/office/drawing/2010/main">
-        <mc:Choice Requires="a14">
+      <mc:AlternateContent xmlns:mc="http://schemas.openxmlformats.org/markup-compatibility/2006">
+        <mc:Choice xmlns:a14="http://schemas.microsoft.com/office/drawing/2010/main" Requires="a14">
           <p:sp>
             <p:nvSpPr>
               <p:cNvPr id="3" name="Content Placeholder 2"/>
@@ -7219,7 +8076,9 @@
             </p:nvSpPr>
             <p:spPr/>
             <p:txBody>
-              <a:bodyPr/>
+              <a:bodyPr>
+                <a:normAutofit/>
+              </a:bodyPr>
               <a:lstStyle/>
               <a:p>
                 <a:pPr marL="0" indent="0">
@@ -7550,16 +8409,14 @@
                           <m:r>
                             <a:rPr lang="en-US" i="1">
                               <a:latin typeface="Cambria Math" panose="02040503050406030204" pitchFamily="18" charset="0"/>
-                              <a:ea typeface="Cambria Math" panose="02040503050406030204" pitchFamily="18" charset="0"/>
-                            </a:rPr>
-                            <m:t>𝑥</m:t>
+                            </a:rPr>
+                            <m:t>𝑑</m:t>
                           </m:r>
                           <m:d>
                             <m:dPr>
                               <m:ctrlPr>
                                 <a:rPr lang="en-US" i="1">
                                   <a:latin typeface="Cambria Math" panose="02040503050406030204" pitchFamily="18" charset="0"/>
-                                  <a:ea typeface="Cambria Math" panose="02040503050406030204" pitchFamily="18" charset="0"/>
                                 </a:rPr>
                               </m:ctrlPr>
                             </m:dPr>
@@ -7567,49 +8424,26 @@
                               <m:r>
                                 <a:rPr lang="en-US" i="1">
                                   <a:latin typeface="Cambria Math" panose="02040503050406030204" pitchFamily="18" charset="0"/>
-                                  <a:ea typeface="Cambria Math" panose="02040503050406030204" pitchFamily="18" charset="0"/>
                                 </a:rPr>
                                 <m:t>𝑠</m:t>
                               </m:r>
                               <m:r>
                                 <a:rPr lang="en-US" i="1">
                                   <a:latin typeface="Cambria Math" panose="02040503050406030204" pitchFamily="18" charset="0"/>
-                                  <a:ea typeface="Cambria Math" panose="02040503050406030204" pitchFamily="18" charset="0"/>
                                 </a:rPr>
-                                <m:t>+1</m:t>
+                                <m:t>,</m:t>
                               </m:r>
-                            </m:e>
-                          </m:d>
-                          <m:r>
-                            <a:rPr lang="en-US" i="1">
-                              <a:latin typeface="Cambria Math" panose="02040503050406030204" pitchFamily="18" charset="0"/>
-                              <a:ea typeface="Cambria Math" panose="02040503050406030204" pitchFamily="18" charset="0"/>
-                            </a:rPr>
-                            <m:t>−</m:t>
-                          </m:r>
-                          <m:r>
-                            <a:rPr lang="en-US" i="1">
-                              <a:latin typeface="Cambria Math" panose="02040503050406030204" pitchFamily="18" charset="0"/>
-                              <a:ea typeface="Cambria Math" panose="02040503050406030204" pitchFamily="18" charset="0"/>
-                            </a:rPr>
-                            <m:t>𝑥</m:t>
-                          </m:r>
-                          <m:d>
-                            <m:dPr>
-                              <m:ctrlPr>
-                                <a:rPr lang="en-US" i="1">
-                                  <a:latin typeface="Cambria Math" panose="02040503050406030204" pitchFamily="18" charset="0"/>
-                                  <a:ea typeface="Cambria Math" panose="02040503050406030204" pitchFamily="18" charset="0"/>
-                                </a:rPr>
-                              </m:ctrlPr>
-                            </m:dPr>
-                            <m:e>
                               <m:r>
                                 <a:rPr lang="en-US" i="1">
                                   <a:latin typeface="Cambria Math" panose="02040503050406030204" pitchFamily="18" charset="0"/>
-                                  <a:ea typeface="Cambria Math" panose="02040503050406030204" pitchFamily="18" charset="0"/>
                                 </a:rPr>
                                 <m:t>𝑠</m:t>
+                              </m:r>
+                              <m:r>
+                                <a:rPr lang="en-US" i="1">
+                                  <a:latin typeface="Cambria Math" panose="02040503050406030204" pitchFamily="18" charset="0"/>
+                                </a:rPr>
+                                <m:t>+1</m:t>
                               </m:r>
                             </m:e>
                           </m:d>
@@ -7723,16 +8557,14 @@
                           <m:r>
                             <a:rPr lang="en-US" i="1">
                               <a:latin typeface="Cambria Math" panose="02040503050406030204" pitchFamily="18" charset="0"/>
-                              <a:ea typeface="Cambria Math" panose="02040503050406030204" pitchFamily="18" charset="0"/>
-                            </a:rPr>
-                            <m:t>𝑥</m:t>
+                            </a:rPr>
+                            <m:t>𝑑</m:t>
                           </m:r>
                           <m:d>
                             <m:dPr>
                               <m:ctrlPr>
                                 <a:rPr lang="en-US" i="1">
                                   <a:latin typeface="Cambria Math" panose="02040503050406030204" pitchFamily="18" charset="0"/>
-                                  <a:ea typeface="Cambria Math" panose="02040503050406030204" pitchFamily="18" charset="0"/>
                                 </a:rPr>
                               </m:ctrlPr>
                             </m:dPr>
@@ -7740,56 +8572,26 @@
                               <m:r>
                                 <a:rPr lang="en-US" i="1">
                                   <a:latin typeface="Cambria Math" panose="02040503050406030204" pitchFamily="18" charset="0"/>
-                                  <a:ea typeface="Cambria Math" panose="02040503050406030204" pitchFamily="18" charset="0"/>
                                 </a:rPr>
                                 <m:t>𝑠</m:t>
                               </m:r>
                               <m:r>
                                 <a:rPr lang="en-US" i="1">
                                   <a:latin typeface="Cambria Math" panose="02040503050406030204" pitchFamily="18" charset="0"/>
-                                  <a:ea typeface="Cambria Math" panose="02040503050406030204" pitchFamily="18" charset="0"/>
                                 </a:rPr>
-                                <m:t>+1</m:t>
+                                <m:t>,</m:t>
                               </m:r>
-                            </m:e>
-                          </m:d>
-                          <m:r>
-                            <a:rPr lang="en-US" i="1">
-                              <a:latin typeface="Cambria Math" panose="02040503050406030204" pitchFamily="18" charset="0"/>
-                              <a:ea typeface="Cambria Math" panose="02040503050406030204" pitchFamily="18" charset="0"/>
-                            </a:rPr>
-                            <m:t>−</m:t>
-                          </m:r>
-                          <m:r>
-                            <a:rPr lang="en-US" b="0" i="1" smtClean="0">
-                              <a:latin typeface="Cambria Math" panose="02040503050406030204" pitchFamily="18" charset="0"/>
-                              <a:ea typeface="Cambria Math" panose="02040503050406030204" pitchFamily="18" charset="0"/>
-                            </a:rPr>
-                            <m:t>2</m:t>
-                          </m:r>
-                          <m:r>
-                            <a:rPr lang="en-US" i="1">
-                              <a:latin typeface="Cambria Math" panose="02040503050406030204" pitchFamily="18" charset="0"/>
-                              <a:ea typeface="Cambria Math" panose="02040503050406030204" pitchFamily="18" charset="0"/>
-                            </a:rPr>
-                            <m:t>𝑥</m:t>
-                          </m:r>
-                          <m:d>
-                            <m:dPr>
-                              <m:ctrlPr>
-                                <a:rPr lang="en-US" i="1">
-                                  <a:latin typeface="Cambria Math" panose="02040503050406030204" pitchFamily="18" charset="0"/>
-                                  <a:ea typeface="Cambria Math" panose="02040503050406030204" pitchFamily="18" charset="0"/>
-                                </a:rPr>
-                              </m:ctrlPr>
-                            </m:dPr>
-                            <m:e>
                               <m:r>
                                 <a:rPr lang="en-US" i="1">
                                   <a:latin typeface="Cambria Math" panose="02040503050406030204" pitchFamily="18" charset="0"/>
-                                  <a:ea typeface="Cambria Math" panose="02040503050406030204" pitchFamily="18" charset="0"/>
                                 </a:rPr>
                                 <m:t>𝑠</m:t>
+                              </m:r>
+                              <m:r>
+                                <a:rPr lang="en-US" i="1">
+                                  <a:latin typeface="Cambria Math" panose="02040503050406030204" pitchFamily="18" charset="0"/>
+                                </a:rPr>
+                                <m:t>+1</m:t>
                               </m:r>
                             </m:e>
                           </m:d>
@@ -7808,10 +8610,149 @@
                 <a:endParaRPr lang="en-US" i="1" dirty="0" smtClean="0"/>
               </a:p>
               <a:p>
+                <a:pPr lvl="2"/>
+                <a:r>
+                  <a:rPr lang="en-US" dirty="0" smtClean="0"/>
+                  <a:t>Where </a:t>
+                </a:r>
+              </a:p>
+              <a:p>
+                <a:pPr marL="457200" lvl="1" indent="0">
+                  <a:buNone/>
+                </a:pPr>
+                <a14:m>
+                  <m:oMathPara xmlns:m="http://schemas.openxmlformats.org/officeDocument/2006/math">
+                    <m:oMathParaPr>
+                      <m:jc m:val="centerGroup"/>
+                    </m:oMathParaPr>
+                    <m:oMath xmlns:m="http://schemas.openxmlformats.org/officeDocument/2006/math">
+                      <m:r>
+                        <a:rPr lang="en-US" b="0" i="1" smtClean="0">
+                          <a:latin typeface="Cambria Math" panose="02040503050406030204" pitchFamily="18" charset="0"/>
+                        </a:rPr>
+                        <m:t>𝑑</m:t>
+                      </m:r>
+                      <m:d>
+                        <m:dPr>
+                          <m:ctrlPr>
+                            <a:rPr lang="en-US" b="0" i="1" smtClean="0">
+                              <a:latin typeface="Cambria Math" panose="02040503050406030204" pitchFamily="18" charset="0"/>
+                            </a:rPr>
+                          </m:ctrlPr>
+                        </m:dPr>
+                        <m:e>
+                          <m:r>
+                            <a:rPr lang="en-US" b="0" i="1" smtClean="0">
+                              <a:latin typeface="Cambria Math" panose="02040503050406030204" pitchFamily="18" charset="0"/>
+                            </a:rPr>
+                            <m:t>𝑠</m:t>
+                          </m:r>
+                          <m:r>
+                            <a:rPr lang="en-US" b="0" i="1" smtClean="0">
+                              <a:latin typeface="Cambria Math" panose="02040503050406030204" pitchFamily="18" charset="0"/>
+                            </a:rPr>
+                            <m:t>,</m:t>
+                          </m:r>
+                          <m:r>
+                            <a:rPr lang="en-US" b="0" i="1" smtClean="0">
+                              <a:latin typeface="Cambria Math" panose="02040503050406030204" pitchFamily="18" charset="0"/>
+                            </a:rPr>
+                            <m:t>𝑠</m:t>
+                          </m:r>
+                          <m:r>
+                            <a:rPr lang="en-US" b="0" i="1" smtClean="0">
+                              <a:latin typeface="Cambria Math" panose="02040503050406030204" pitchFamily="18" charset="0"/>
+                            </a:rPr>
+                            <m:t>+1</m:t>
+                          </m:r>
+                        </m:e>
+                      </m:d>
+                      <m:r>
+                        <a:rPr lang="en-US" b="0" i="1" smtClean="0">
+                          <a:latin typeface="Cambria Math" panose="02040503050406030204" pitchFamily="18" charset="0"/>
+                        </a:rPr>
+                        <m:t>=</m:t>
+                      </m:r>
+                      <m:r>
+                        <a:rPr lang="en-US" i="1">
+                          <a:latin typeface="Cambria Math" panose="02040503050406030204" pitchFamily="18" charset="0"/>
+                          <a:ea typeface="Cambria Math" panose="02040503050406030204" pitchFamily="18" charset="0"/>
+                        </a:rPr>
+                        <m:t>𝑥</m:t>
+                      </m:r>
+                      <m:d>
+                        <m:dPr>
+                          <m:ctrlPr>
+                            <a:rPr lang="en-US" i="1">
+                              <a:latin typeface="Cambria Math" panose="02040503050406030204" pitchFamily="18" charset="0"/>
+                              <a:ea typeface="Cambria Math" panose="02040503050406030204" pitchFamily="18" charset="0"/>
+                            </a:rPr>
+                          </m:ctrlPr>
+                        </m:dPr>
+                        <m:e>
+                          <m:r>
+                            <a:rPr lang="en-US" i="1">
+                              <a:latin typeface="Cambria Math" panose="02040503050406030204" pitchFamily="18" charset="0"/>
+                              <a:ea typeface="Cambria Math" panose="02040503050406030204" pitchFamily="18" charset="0"/>
+                            </a:rPr>
+                            <m:t>𝑠</m:t>
+                          </m:r>
+                          <m:r>
+                            <a:rPr lang="en-US" i="1">
+                              <a:latin typeface="Cambria Math" panose="02040503050406030204" pitchFamily="18" charset="0"/>
+                              <a:ea typeface="Cambria Math" panose="02040503050406030204" pitchFamily="18" charset="0"/>
+                            </a:rPr>
+                            <m:t>+1</m:t>
+                          </m:r>
+                        </m:e>
+                      </m:d>
+                      <m:r>
+                        <a:rPr lang="en-US" i="1">
+                          <a:latin typeface="Cambria Math" panose="02040503050406030204" pitchFamily="18" charset="0"/>
+                          <a:ea typeface="Cambria Math" panose="02040503050406030204" pitchFamily="18" charset="0"/>
+                        </a:rPr>
+                        <m:t>−</m:t>
+                      </m:r>
+                      <m:r>
+                        <a:rPr lang="en-US" i="1">
+                          <a:latin typeface="Cambria Math" panose="02040503050406030204" pitchFamily="18" charset="0"/>
+                          <a:ea typeface="Cambria Math" panose="02040503050406030204" pitchFamily="18" charset="0"/>
+                        </a:rPr>
+                        <m:t>𝑥</m:t>
+                      </m:r>
+                      <m:d>
+                        <m:dPr>
+                          <m:ctrlPr>
+                            <a:rPr lang="en-US" i="1">
+                              <a:latin typeface="Cambria Math" panose="02040503050406030204" pitchFamily="18" charset="0"/>
+                              <a:ea typeface="Cambria Math" panose="02040503050406030204" pitchFamily="18" charset="0"/>
+                            </a:rPr>
+                          </m:ctrlPr>
+                        </m:dPr>
+                        <m:e>
+                          <m:r>
+                            <a:rPr lang="en-US" i="1">
+                              <a:latin typeface="Cambria Math" panose="02040503050406030204" pitchFamily="18" charset="0"/>
+                              <a:ea typeface="Cambria Math" panose="02040503050406030204" pitchFamily="18" charset="0"/>
+                            </a:rPr>
+                            <m:t>𝑠</m:t>
+                          </m:r>
+                        </m:e>
+                      </m:d>
+                    </m:oMath>
+                  </m:oMathPara>
+                </a14:m>
+                <a:endParaRPr lang="en-US" dirty="0" smtClean="0"/>
+              </a:p>
+              <a:p>
                 <a:pPr lvl="1"/>
                 <a:r>
                   <a:rPr lang="en-US" dirty="0" smtClean="0"/>
-                  <a:t>Review properties:</a:t>
+                  <a:t>Review </a:t>
+                </a:r>
+                <a:r>
+                  <a:rPr lang="en-US" dirty="0" smtClean="0"/>
+                  <a:t>properties:</a:t>
                 </a:r>
               </a:p>
               <a:p>
@@ -8127,16 +9068,14 @@
                           <m:r>
                             <a:rPr lang="en-US" i="1">
                               <a:latin typeface="Cambria Math" panose="02040503050406030204" pitchFamily="18" charset="0"/>
-                              <a:ea typeface="Cambria Math" panose="02040503050406030204" pitchFamily="18" charset="0"/>
-                            </a:rPr>
-                            <m:t>𝑥</m:t>
+                            </a:rPr>
+                            <m:t>𝑑</m:t>
                           </m:r>
                           <m:d>
                             <m:dPr>
                               <m:ctrlPr>
                                 <a:rPr lang="en-US" i="1">
                                   <a:latin typeface="Cambria Math" panose="02040503050406030204" pitchFamily="18" charset="0"/>
-                                  <a:ea typeface="Cambria Math" panose="02040503050406030204" pitchFamily="18" charset="0"/>
                                 </a:rPr>
                               </m:ctrlPr>
                             </m:dPr>
@@ -8144,49 +9083,26 @@
                               <m:r>
                                 <a:rPr lang="en-US" i="1">
                                   <a:latin typeface="Cambria Math" panose="02040503050406030204" pitchFamily="18" charset="0"/>
-                                  <a:ea typeface="Cambria Math" panose="02040503050406030204" pitchFamily="18" charset="0"/>
                                 </a:rPr>
                                 <m:t>𝑠</m:t>
                               </m:r>
                               <m:r>
                                 <a:rPr lang="en-US" i="1">
                                   <a:latin typeface="Cambria Math" panose="02040503050406030204" pitchFamily="18" charset="0"/>
-                                  <a:ea typeface="Cambria Math" panose="02040503050406030204" pitchFamily="18" charset="0"/>
                                 </a:rPr>
-                                <m:t>+1</m:t>
+                                <m:t>,</m:t>
                               </m:r>
-                            </m:e>
-                          </m:d>
-                          <m:r>
-                            <a:rPr lang="en-US" i="1">
-                              <a:latin typeface="Cambria Math" panose="02040503050406030204" pitchFamily="18" charset="0"/>
-                              <a:ea typeface="Cambria Math" panose="02040503050406030204" pitchFamily="18" charset="0"/>
-                            </a:rPr>
-                            <m:t>−</m:t>
-                          </m:r>
-                          <m:r>
-                            <a:rPr lang="en-US" i="1">
-                              <a:latin typeface="Cambria Math" panose="02040503050406030204" pitchFamily="18" charset="0"/>
-                              <a:ea typeface="Cambria Math" panose="02040503050406030204" pitchFamily="18" charset="0"/>
-                            </a:rPr>
-                            <m:t>𝑥</m:t>
-                          </m:r>
-                          <m:d>
-                            <m:dPr>
-                              <m:ctrlPr>
-                                <a:rPr lang="en-US" i="1">
-                                  <a:latin typeface="Cambria Math" panose="02040503050406030204" pitchFamily="18" charset="0"/>
-                                  <a:ea typeface="Cambria Math" panose="02040503050406030204" pitchFamily="18" charset="0"/>
-                                </a:rPr>
-                              </m:ctrlPr>
-                            </m:dPr>
-                            <m:e>
                               <m:r>
                                 <a:rPr lang="en-US" i="1">
                                   <a:latin typeface="Cambria Math" panose="02040503050406030204" pitchFamily="18" charset="0"/>
-                                  <a:ea typeface="Cambria Math" panose="02040503050406030204" pitchFamily="18" charset="0"/>
                                 </a:rPr>
                                 <m:t>𝑠</m:t>
+                              </m:r>
+                              <m:r>
+                                <a:rPr lang="en-US" i="1">
+                                  <a:latin typeface="Cambria Math" panose="02040503050406030204" pitchFamily="18" charset="0"/>
+                                </a:rPr>
+                                <m:t>+1</m:t>
                               </m:r>
                             </m:e>
                           </m:d>
@@ -8379,16 +9295,14 @@
                           <m:r>
                             <a:rPr lang="en-US" i="1">
                               <a:latin typeface="Cambria Math" panose="02040503050406030204" pitchFamily="18" charset="0"/>
-                              <a:ea typeface="Cambria Math" panose="02040503050406030204" pitchFamily="18" charset="0"/>
-                            </a:rPr>
-                            <m:t>𝑥</m:t>
+                            </a:rPr>
+                            <m:t>𝑑</m:t>
                           </m:r>
                           <m:d>
                             <m:dPr>
                               <m:ctrlPr>
                                 <a:rPr lang="en-US" i="1">
                                   <a:latin typeface="Cambria Math" panose="02040503050406030204" pitchFamily="18" charset="0"/>
-                                  <a:ea typeface="Cambria Math" panose="02040503050406030204" pitchFamily="18" charset="0"/>
                                 </a:rPr>
                               </m:ctrlPr>
                             </m:dPr>
@@ -8396,49 +9310,26 @@
                               <m:r>
                                 <a:rPr lang="en-US" i="1">
                                   <a:latin typeface="Cambria Math" panose="02040503050406030204" pitchFamily="18" charset="0"/>
-                                  <a:ea typeface="Cambria Math" panose="02040503050406030204" pitchFamily="18" charset="0"/>
                                 </a:rPr>
                                 <m:t>𝑠</m:t>
                               </m:r>
                               <m:r>
                                 <a:rPr lang="en-US" i="1">
                                   <a:latin typeface="Cambria Math" panose="02040503050406030204" pitchFamily="18" charset="0"/>
-                                  <a:ea typeface="Cambria Math" panose="02040503050406030204" pitchFamily="18" charset="0"/>
                                 </a:rPr>
-                                <m:t>+1</m:t>
+                                <m:t>,</m:t>
                               </m:r>
-                            </m:e>
-                          </m:d>
-                          <m:r>
-                            <a:rPr lang="en-US" i="1">
-                              <a:latin typeface="Cambria Math" panose="02040503050406030204" pitchFamily="18" charset="0"/>
-                              <a:ea typeface="Cambria Math" panose="02040503050406030204" pitchFamily="18" charset="0"/>
-                            </a:rPr>
-                            <m:t>−</m:t>
-                          </m:r>
-                          <m:r>
-                            <a:rPr lang="en-US" i="1">
-                              <a:latin typeface="Cambria Math" panose="02040503050406030204" pitchFamily="18" charset="0"/>
-                              <a:ea typeface="Cambria Math" panose="02040503050406030204" pitchFamily="18" charset="0"/>
-                            </a:rPr>
-                            <m:t>𝑥</m:t>
-                          </m:r>
-                          <m:d>
-                            <m:dPr>
-                              <m:ctrlPr>
-                                <a:rPr lang="en-US" i="1">
-                                  <a:latin typeface="Cambria Math" panose="02040503050406030204" pitchFamily="18" charset="0"/>
-                                  <a:ea typeface="Cambria Math" panose="02040503050406030204" pitchFamily="18" charset="0"/>
-                                </a:rPr>
-                              </m:ctrlPr>
-                            </m:dPr>
-                            <m:e>
                               <m:r>
                                 <a:rPr lang="en-US" i="1">
                                   <a:latin typeface="Cambria Math" panose="02040503050406030204" pitchFamily="18" charset="0"/>
-                                  <a:ea typeface="Cambria Math" panose="02040503050406030204" pitchFamily="18" charset="0"/>
                                 </a:rPr>
                                 <m:t>𝑠</m:t>
+                              </m:r>
+                              <m:r>
+                                <a:rPr lang="en-US" i="1">
+                                  <a:latin typeface="Cambria Math" panose="02040503050406030204" pitchFamily="18" charset="0"/>
+                                </a:rPr>
+                                <m:t>+1</m:t>
                               </m:r>
                             </m:e>
                           </m:d>
@@ -8464,7 +9355,7 @@
             </p:txBody>
           </p:sp>
         </mc:Choice>
-        <mc:Fallback xmlns="">
+        <mc:Fallback>
           <p:sp>
             <p:nvSpPr>
               <p:cNvPr id="3" name="Content Placeholder 2"/>
@@ -8518,7 +9409,1118 @@
 </p:sld>
 </file>
 
-<file path=ppt/slides/slide6.xml><?xml version="1.0" encoding="utf-8"?>
+<file path=ppt/slides/slide7.xml><?xml version="1.0" encoding="utf-8"?>
+<p:sld xmlns:a="http://schemas.openxmlformats.org/drawingml/2006/main" xmlns:r="http://schemas.openxmlformats.org/officeDocument/2006/relationships" xmlns:p="http://schemas.openxmlformats.org/presentationml/2006/main">
+  <p:cSld>
+    <p:spTree>
+      <p:nvGrpSpPr>
+        <p:cNvPr id="1" name=""/>
+        <p:cNvGrpSpPr/>
+        <p:nvPr/>
+      </p:nvGrpSpPr>
+      <p:grpSpPr>
+        <a:xfrm>
+          <a:off x="0" y="0"/>
+          <a:ext cx="0" cy="0"/>
+          <a:chOff x="0" y="0"/>
+          <a:chExt cx="0" cy="0"/>
+        </a:xfrm>
+      </p:grpSpPr>
+      <p:sp>
+        <p:nvSpPr>
+          <p:cNvPr id="2" name="Title 1"/>
+          <p:cNvSpPr>
+            <a:spLocks noGrp="1"/>
+          </p:cNvSpPr>
+          <p:nvPr>
+            <p:ph type="title"/>
+          </p:nvPr>
+        </p:nvSpPr>
+        <p:spPr/>
+        <p:txBody>
+          <a:bodyPr/>
+          <a:lstStyle/>
+          <a:p>
+            <a:endParaRPr lang="en-GB"/>
+          </a:p>
+        </p:txBody>
+      </p:sp>
+      <mc:AlternateContent xmlns:mc="http://schemas.openxmlformats.org/markup-compatibility/2006">
+        <mc:Choice xmlns:a14="http://schemas.microsoft.com/office/drawing/2010/main" Requires="a14">
+          <p:sp>
+            <p:nvSpPr>
+              <p:cNvPr id="3" name="Content Placeholder 2"/>
+              <p:cNvSpPr>
+                <a:spLocks noGrp="1"/>
+              </p:cNvSpPr>
+              <p:nvPr>
+                <p:ph idx="1"/>
+              </p:nvPr>
+            </p:nvSpPr>
+            <p:spPr/>
+            <p:txBody>
+              <a:bodyPr>
+                <a:normAutofit/>
+              </a:bodyPr>
+              <a:lstStyle/>
+              <a:p>
+                <a:pPr marL="0" indent="0">
+                  <a:buNone/>
+                </a:pPr>
+                <a:r>
+                  <a:rPr lang="en-US" dirty="0" smtClean="0"/>
+                  <a:t>Unequal distance </a:t>
+                </a:r>
+                <a:r>
+                  <a:rPr lang="en-US" dirty="0" err="1" smtClean="0"/>
+                  <a:t>autoregression</a:t>
+                </a:r>
+                <a:endParaRPr lang="en-US" dirty="0" smtClean="0"/>
+              </a:p>
+              <a:p>
+                <a:pPr marL="0" indent="0">
+                  <a:buNone/>
+                </a:pPr>
+                <a14:m>
+                  <m:oMathPara xmlns:m="http://schemas.openxmlformats.org/officeDocument/2006/math">
+                    <m:oMathParaPr>
+                      <m:jc m:val="centerGroup"/>
+                    </m:oMathParaPr>
+                    <m:oMath xmlns:m="http://schemas.openxmlformats.org/officeDocument/2006/math">
+                      <m:sSub>
+                        <m:sSubPr>
+                          <m:ctrlPr>
+                            <a:rPr lang="en-US" i="1">
+                              <a:latin typeface="Cambria Math" panose="02040503050406030204" pitchFamily="18" charset="0"/>
+                              <a:ea typeface="Cambria Math" panose="02040503050406030204" pitchFamily="18" charset="0"/>
+                            </a:rPr>
+                          </m:ctrlPr>
+                        </m:sSubPr>
+                        <m:e>
+                          <m:r>
+                            <a:rPr lang="en-US" i="1">
+                              <a:latin typeface="Cambria Math" panose="02040503050406030204" pitchFamily="18" charset="0"/>
+                              <a:ea typeface="Cambria Math" panose="02040503050406030204" pitchFamily="18" charset="0"/>
+                            </a:rPr>
+                            <m:t>𝑐</m:t>
+                          </m:r>
+                        </m:e>
+                        <m:sub>
+                          <m:r>
+                            <a:rPr lang="en-US" i="1">
+                              <a:latin typeface="Cambria Math" panose="02040503050406030204" pitchFamily="18" charset="0"/>
+                              <a:ea typeface="Cambria Math" panose="02040503050406030204" pitchFamily="18" charset="0"/>
+                            </a:rPr>
+                            <m:t>𝑠</m:t>
+                          </m:r>
+                        </m:sub>
+                      </m:sSub>
+                      <m:r>
+                        <a:rPr lang="en-US" i="1">
+                          <a:latin typeface="Cambria Math" panose="02040503050406030204" pitchFamily="18" charset="0"/>
+                          <a:ea typeface="Cambria Math" panose="02040503050406030204" pitchFamily="18" charset="0"/>
+                        </a:rPr>
+                        <m:t>(</m:t>
+                      </m:r>
+                      <m:r>
+                        <a:rPr lang="en-US" i="1">
+                          <a:latin typeface="Cambria Math" panose="02040503050406030204" pitchFamily="18" charset="0"/>
+                          <a:ea typeface="Cambria Math" panose="02040503050406030204" pitchFamily="18" charset="0"/>
+                        </a:rPr>
+                        <m:t>𝑖</m:t>
+                      </m:r>
+                      <m:r>
+                        <a:rPr lang="en-US" i="1">
+                          <a:latin typeface="Cambria Math" panose="02040503050406030204" pitchFamily="18" charset="0"/>
+                          <a:ea typeface="Cambria Math" panose="02040503050406030204" pitchFamily="18" charset="0"/>
+                        </a:rPr>
+                        <m:t>)~</m:t>
+                      </m:r>
+                      <m:r>
+                        <a:rPr lang="en-US" i="1">
+                          <a:latin typeface="Cambria Math" panose="02040503050406030204" pitchFamily="18" charset="0"/>
+                          <a:ea typeface="Cambria Math" panose="02040503050406030204" pitchFamily="18" charset="0"/>
+                        </a:rPr>
+                        <m:t>𝑔</m:t>
+                      </m:r>
+                      <m:r>
+                        <a:rPr lang="en-US" i="1">
+                          <a:latin typeface="Cambria Math" panose="02040503050406030204" pitchFamily="18" charset="0"/>
+                          <a:ea typeface="Cambria Math" panose="02040503050406030204" pitchFamily="18" charset="0"/>
+                        </a:rPr>
+                        <m:t>(</m:t>
+                      </m:r>
+                      <m:sSub>
+                        <m:sSubPr>
+                          <m:ctrlPr>
+                            <a:rPr lang="en-US" i="1">
+                              <a:latin typeface="Cambria Math" panose="02040503050406030204" pitchFamily="18" charset="0"/>
+                              <a:ea typeface="Cambria Math" panose="02040503050406030204" pitchFamily="18" charset="0"/>
+                            </a:rPr>
+                          </m:ctrlPr>
+                        </m:sSubPr>
+                        <m:e>
+                          <m:r>
+                            <a:rPr lang="en-US" i="1">
+                              <a:latin typeface="Cambria Math" panose="02040503050406030204" pitchFamily="18" charset="0"/>
+                              <a:ea typeface="Cambria Math" panose="02040503050406030204" pitchFamily="18" charset="0"/>
+                            </a:rPr>
+                            <m:t>𝜇</m:t>
+                          </m:r>
+                        </m:e>
+                        <m:sub>
+                          <m:r>
+                            <a:rPr lang="en-US" i="1">
+                              <a:latin typeface="Cambria Math" panose="02040503050406030204" pitchFamily="18" charset="0"/>
+                              <a:ea typeface="Cambria Math" panose="02040503050406030204" pitchFamily="18" charset="0"/>
+                            </a:rPr>
+                            <m:t>𝑠</m:t>
+                          </m:r>
+                        </m:sub>
+                      </m:sSub>
+                      <m:r>
+                        <a:rPr lang="en-US" i="1">
+                          <a:latin typeface="Cambria Math" panose="02040503050406030204" pitchFamily="18" charset="0"/>
+                          <a:ea typeface="Cambria Math" panose="02040503050406030204" pitchFamily="18" charset="0"/>
+                        </a:rPr>
+                        <m:t>)</m:t>
+                      </m:r>
+                    </m:oMath>
+                  </m:oMathPara>
+                </a14:m>
+                <a:endParaRPr lang="en-US" dirty="0"/>
+              </a:p>
+              <a:p>
+                <a:pPr marL="0" indent="0">
+                  <a:buNone/>
+                </a:pPr>
+                <a14:m>
+                  <m:oMathPara xmlns:m="http://schemas.openxmlformats.org/officeDocument/2006/math">
+                    <m:oMathParaPr>
+                      <m:jc m:val="centerGroup"/>
+                    </m:oMathParaPr>
+                    <m:oMath xmlns:m="http://schemas.openxmlformats.org/officeDocument/2006/math">
+                      <m:sSub>
+                        <m:sSubPr>
+                          <m:ctrlPr>
+                            <a:rPr lang="en-US" i="1">
+                              <a:latin typeface="Cambria Math" panose="02040503050406030204" pitchFamily="18" charset="0"/>
+                              <a:ea typeface="Cambria Math" panose="02040503050406030204" pitchFamily="18" charset="0"/>
+                            </a:rPr>
+                          </m:ctrlPr>
+                        </m:sSubPr>
+                        <m:e>
+                          <m:r>
+                            <a:rPr lang="en-US" i="1">
+                              <a:latin typeface="Cambria Math" panose="02040503050406030204" pitchFamily="18" charset="0"/>
+                              <a:ea typeface="Cambria Math" panose="02040503050406030204" pitchFamily="18" charset="0"/>
+                            </a:rPr>
+                            <m:t>𝜇</m:t>
+                          </m:r>
+                        </m:e>
+                        <m:sub>
+                          <m:r>
+                            <a:rPr lang="en-US" i="1">
+                              <a:latin typeface="Cambria Math" panose="02040503050406030204" pitchFamily="18" charset="0"/>
+                              <a:ea typeface="Cambria Math" panose="02040503050406030204" pitchFamily="18" charset="0"/>
+                            </a:rPr>
+                            <m:t>𝑠</m:t>
+                          </m:r>
+                        </m:sub>
+                      </m:sSub>
+                      <m:r>
+                        <a:rPr lang="en-US" i="1">
+                          <a:latin typeface="Cambria Math" panose="02040503050406030204" pitchFamily="18" charset="0"/>
+                          <a:ea typeface="Cambria Math" panose="02040503050406030204" pitchFamily="18" charset="0"/>
+                        </a:rPr>
+                        <m:t>=</m:t>
+                      </m:r>
+                      <m:r>
+                        <a:rPr lang="en-US" b="1">
+                          <a:latin typeface="Cambria Math" panose="02040503050406030204" pitchFamily="18" charset="0"/>
+                          <a:ea typeface="Cambria Math" panose="02040503050406030204" pitchFamily="18" charset="0"/>
+                        </a:rPr>
+                        <m:t>𝐗</m:t>
+                      </m:r>
+                      <m:r>
+                        <a:rPr lang="en-US" b="1">
+                          <a:latin typeface="Cambria Math" panose="02040503050406030204" pitchFamily="18" charset="0"/>
+                          <a:ea typeface="Cambria Math" panose="02040503050406030204" pitchFamily="18" charset="0"/>
+                        </a:rPr>
+                        <m:t>𝛃</m:t>
+                      </m:r>
+                      <m:r>
+                        <a:rPr lang="en-US" b="1">
+                          <a:latin typeface="Cambria Math" panose="02040503050406030204" pitchFamily="18" charset="0"/>
+                          <a:ea typeface="Cambria Math" panose="02040503050406030204" pitchFamily="18" charset="0"/>
+                        </a:rPr>
+                        <m:t>+</m:t>
+                      </m:r>
+                      <m:sSub>
+                        <m:sSubPr>
+                          <m:ctrlPr>
+                            <a:rPr lang="en-US" i="1">
+                              <a:latin typeface="Cambria Math" panose="02040503050406030204" pitchFamily="18" charset="0"/>
+                              <a:ea typeface="Cambria Math" panose="02040503050406030204" pitchFamily="18" charset="0"/>
+                            </a:rPr>
+                          </m:ctrlPr>
+                        </m:sSubPr>
+                        <m:e>
+                          <m:r>
+                            <a:rPr lang="en-US" i="1">
+                              <a:latin typeface="Cambria Math" panose="02040503050406030204" pitchFamily="18" charset="0"/>
+                              <a:ea typeface="Cambria Math" panose="02040503050406030204" pitchFamily="18" charset="0"/>
+                            </a:rPr>
+                            <m:t>𝜀</m:t>
+                          </m:r>
+                        </m:e>
+                        <m:sub>
+                          <m:r>
+                            <a:rPr lang="en-US" i="1">
+                              <a:latin typeface="Cambria Math" panose="02040503050406030204" pitchFamily="18" charset="0"/>
+                              <a:ea typeface="Cambria Math" panose="02040503050406030204" pitchFamily="18" charset="0"/>
+                            </a:rPr>
+                            <m:t>𝑠</m:t>
+                          </m:r>
+                        </m:sub>
+                      </m:sSub>
+                    </m:oMath>
+                  </m:oMathPara>
+                </a14:m>
+                <a:endParaRPr lang="en-US" b="1" dirty="0"/>
+              </a:p>
+              <a:p>
+                <a:pPr marL="457200" lvl="1" indent="0">
+                  <a:buNone/>
+                </a:pPr>
+                <a14:m>
+                  <m:oMathPara xmlns:m="http://schemas.openxmlformats.org/officeDocument/2006/math">
+                    <m:oMathParaPr>
+                      <m:jc m:val="centerGroup"/>
+                    </m:oMathParaPr>
+                    <m:oMath xmlns:m="http://schemas.openxmlformats.org/officeDocument/2006/math">
+                      <m:sSub>
+                        <m:sSubPr>
+                          <m:ctrlPr>
+                            <a:rPr lang="en-US" i="1">
+                              <a:latin typeface="Cambria Math" panose="02040503050406030204" pitchFamily="18" charset="0"/>
+                              <a:ea typeface="Cambria Math" panose="02040503050406030204" pitchFamily="18" charset="0"/>
+                            </a:rPr>
+                          </m:ctrlPr>
+                        </m:sSubPr>
+                        <m:e>
+                          <m:r>
+                            <a:rPr lang="en-US" i="1">
+                              <a:latin typeface="Cambria Math" panose="02040503050406030204" pitchFamily="18" charset="0"/>
+                              <a:ea typeface="Cambria Math" panose="02040503050406030204" pitchFamily="18" charset="0"/>
+                            </a:rPr>
+                            <m:t>𝜀</m:t>
+                          </m:r>
+                        </m:e>
+                        <m:sub>
+                          <m:r>
+                            <a:rPr lang="en-US" i="1">
+                              <a:latin typeface="Cambria Math" panose="02040503050406030204" pitchFamily="18" charset="0"/>
+                              <a:ea typeface="Cambria Math" panose="02040503050406030204" pitchFamily="18" charset="0"/>
+                            </a:rPr>
+                            <m:t>𝑠</m:t>
+                          </m:r>
+                          <m:r>
+                            <a:rPr lang="en-US" i="1">
+                              <a:latin typeface="Cambria Math" panose="02040503050406030204" pitchFamily="18" charset="0"/>
+                              <a:ea typeface="Cambria Math" panose="02040503050406030204" pitchFamily="18" charset="0"/>
+                            </a:rPr>
+                            <m:t>+1</m:t>
+                          </m:r>
+                        </m:sub>
+                      </m:sSub>
+                      <m:r>
+                        <a:rPr lang="en-US" b="0" i="1" smtClean="0">
+                          <a:latin typeface="Cambria Math" panose="02040503050406030204" pitchFamily="18" charset="0"/>
+                          <a:ea typeface="Cambria Math" panose="02040503050406030204" pitchFamily="18" charset="0"/>
+                        </a:rPr>
+                        <m:t>~</m:t>
+                      </m:r>
+                      <m:r>
+                        <a:rPr lang="en-US" b="0" i="1" smtClean="0">
+                          <a:latin typeface="Cambria Math" panose="02040503050406030204" pitchFamily="18" charset="0"/>
+                          <a:ea typeface="Cambria Math" panose="02040503050406030204" pitchFamily="18" charset="0"/>
+                        </a:rPr>
+                        <m:t>𝑁𝑜𝑟𝑚𝑎𝑙</m:t>
+                      </m:r>
+                      <m:r>
+                        <a:rPr lang="en-US" b="0" i="1" smtClean="0">
+                          <a:latin typeface="Cambria Math" panose="02040503050406030204" pitchFamily="18" charset="0"/>
+                          <a:ea typeface="Cambria Math" panose="02040503050406030204" pitchFamily="18" charset="0"/>
+                        </a:rPr>
+                        <m:t>(</m:t>
+                      </m:r>
+                      <m:sSup>
+                        <m:sSupPr>
+                          <m:ctrlPr>
+                            <a:rPr lang="en-US" b="0" i="1" smtClean="0">
+                              <a:latin typeface="Cambria Math" panose="02040503050406030204" pitchFamily="18" charset="0"/>
+                              <a:ea typeface="Cambria Math" panose="02040503050406030204" pitchFamily="18" charset="0"/>
+                            </a:rPr>
+                          </m:ctrlPr>
+                        </m:sSupPr>
+                        <m:e>
+                          <m:r>
+                            <a:rPr lang="en-US" b="0" i="1" smtClean="0">
+                              <a:latin typeface="Cambria Math" panose="02040503050406030204" pitchFamily="18" charset="0"/>
+                              <a:ea typeface="Cambria Math" panose="02040503050406030204" pitchFamily="18" charset="0"/>
+                            </a:rPr>
+                            <m:t>𝜌</m:t>
+                          </m:r>
+                        </m:e>
+                        <m:sup>
+                          <m:r>
+                            <a:rPr lang="en-US" i="1">
+                              <a:latin typeface="Cambria Math" panose="02040503050406030204" pitchFamily="18" charset="0"/>
+                            </a:rPr>
+                            <m:t>𝑑</m:t>
+                          </m:r>
+                          <m:d>
+                            <m:dPr>
+                              <m:ctrlPr>
+                                <a:rPr lang="en-US" i="1">
+                                  <a:latin typeface="Cambria Math" panose="02040503050406030204" pitchFamily="18" charset="0"/>
+                                </a:rPr>
+                              </m:ctrlPr>
+                            </m:dPr>
+                            <m:e>
+                              <m:r>
+                                <a:rPr lang="en-US" i="1">
+                                  <a:latin typeface="Cambria Math" panose="02040503050406030204" pitchFamily="18" charset="0"/>
+                                </a:rPr>
+                                <m:t>𝑠</m:t>
+                              </m:r>
+                              <m:r>
+                                <a:rPr lang="en-US" i="1">
+                                  <a:latin typeface="Cambria Math" panose="02040503050406030204" pitchFamily="18" charset="0"/>
+                                </a:rPr>
+                                <m:t>,</m:t>
+                              </m:r>
+                              <m:r>
+                                <a:rPr lang="en-US" i="1">
+                                  <a:latin typeface="Cambria Math" panose="02040503050406030204" pitchFamily="18" charset="0"/>
+                                </a:rPr>
+                                <m:t>𝑠</m:t>
+                              </m:r>
+                              <m:r>
+                                <a:rPr lang="en-US" i="1">
+                                  <a:latin typeface="Cambria Math" panose="02040503050406030204" pitchFamily="18" charset="0"/>
+                                </a:rPr>
+                                <m:t>+1</m:t>
+                              </m:r>
+                            </m:e>
+                          </m:d>
+                        </m:sup>
+                      </m:sSup>
+                      <m:sSub>
+                        <m:sSubPr>
+                          <m:ctrlPr>
+                            <a:rPr lang="en-US" i="1">
+                              <a:latin typeface="Cambria Math" panose="02040503050406030204" pitchFamily="18" charset="0"/>
+                              <a:ea typeface="Cambria Math" panose="02040503050406030204" pitchFamily="18" charset="0"/>
+                            </a:rPr>
+                          </m:ctrlPr>
+                        </m:sSubPr>
+                        <m:e>
+                          <m:r>
+                            <a:rPr lang="en-US" i="1">
+                              <a:latin typeface="Cambria Math" panose="02040503050406030204" pitchFamily="18" charset="0"/>
+                              <a:ea typeface="Cambria Math" panose="02040503050406030204" pitchFamily="18" charset="0"/>
+                            </a:rPr>
+                            <m:t>𝜀</m:t>
+                          </m:r>
+                        </m:e>
+                        <m:sub>
+                          <m:r>
+                            <a:rPr lang="en-US" i="1">
+                              <a:latin typeface="Cambria Math" panose="02040503050406030204" pitchFamily="18" charset="0"/>
+                              <a:ea typeface="Cambria Math" panose="02040503050406030204" pitchFamily="18" charset="0"/>
+                            </a:rPr>
+                            <m:t>𝑠</m:t>
+                          </m:r>
+                        </m:sub>
+                      </m:sSub>
+                      <m:r>
+                        <a:rPr lang="en-US" b="0" i="1" smtClean="0">
+                          <a:latin typeface="Cambria Math" panose="02040503050406030204" pitchFamily="18" charset="0"/>
+                          <a:ea typeface="Cambria Math" panose="02040503050406030204" pitchFamily="18" charset="0"/>
+                        </a:rPr>
+                        <m:t>,</m:t>
+                      </m:r>
+                      <m:sSubSup>
+                        <m:sSubSupPr>
+                          <m:ctrlPr>
+                            <a:rPr lang="en-US" b="0" i="1" smtClean="0">
+                              <a:latin typeface="Cambria Math" panose="02040503050406030204" pitchFamily="18" charset="0"/>
+                              <a:ea typeface="Cambria Math" panose="02040503050406030204" pitchFamily="18" charset="0"/>
+                            </a:rPr>
+                          </m:ctrlPr>
+                        </m:sSubSupPr>
+                        <m:e>
+                          <m:r>
+                            <a:rPr lang="en-US" b="0" i="1" smtClean="0">
+                              <a:latin typeface="Cambria Math" panose="02040503050406030204" pitchFamily="18" charset="0"/>
+                              <a:ea typeface="Cambria Math" panose="02040503050406030204" pitchFamily="18" charset="0"/>
+                            </a:rPr>
+                            <m:t>𝜎</m:t>
+                          </m:r>
+                        </m:e>
+                        <m:sub>
+                          <m:r>
+                            <a:rPr lang="en-US" b="0" i="1" smtClean="0">
+                              <a:latin typeface="Cambria Math" panose="02040503050406030204" pitchFamily="18" charset="0"/>
+                              <a:ea typeface="Cambria Math" panose="02040503050406030204" pitchFamily="18" charset="0"/>
+                            </a:rPr>
+                            <m:t>𝜀</m:t>
+                          </m:r>
+                        </m:sub>
+                        <m:sup>
+                          <m:r>
+                            <a:rPr lang="en-US" b="0" i="1" smtClean="0">
+                              <a:latin typeface="Cambria Math" panose="02040503050406030204" pitchFamily="18" charset="0"/>
+                              <a:ea typeface="Cambria Math" panose="02040503050406030204" pitchFamily="18" charset="0"/>
+                            </a:rPr>
+                            <m:t>2</m:t>
+                          </m:r>
+                        </m:sup>
+                      </m:sSubSup>
+                      <m:r>
+                        <a:rPr lang="en-US" b="0" i="1" smtClean="0">
+                          <a:latin typeface="Cambria Math" panose="02040503050406030204" pitchFamily="18" charset="0"/>
+                          <a:ea typeface="Cambria Math" panose="02040503050406030204" pitchFamily="18" charset="0"/>
+                        </a:rPr>
+                        <m:t>(1−</m:t>
+                      </m:r>
+                      <m:sSup>
+                        <m:sSupPr>
+                          <m:ctrlPr>
+                            <a:rPr lang="en-US" i="1">
+                              <a:latin typeface="Cambria Math" panose="02040503050406030204" pitchFamily="18" charset="0"/>
+                              <a:ea typeface="Cambria Math" panose="02040503050406030204" pitchFamily="18" charset="0"/>
+                            </a:rPr>
+                          </m:ctrlPr>
+                        </m:sSupPr>
+                        <m:e>
+                          <m:r>
+                            <a:rPr lang="en-US" i="1">
+                              <a:latin typeface="Cambria Math" panose="02040503050406030204" pitchFamily="18" charset="0"/>
+                              <a:ea typeface="Cambria Math" panose="02040503050406030204" pitchFamily="18" charset="0"/>
+                            </a:rPr>
+                            <m:t>𝜌</m:t>
+                          </m:r>
+                        </m:e>
+                        <m:sup>
+                          <m:r>
+                            <a:rPr lang="en-US" b="0" i="1" smtClean="0">
+                              <a:latin typeface="Cambria Math" panose="02040503050406030204" pitchFamily="18" charset="0"/>
+                              <a:ea typeface="Cambria Math" panose="02040503050406030204" pitchFamily="18" charset="0"/>
+                            </a:rPr>
+                            <m:t>2</m:t>
+                          </m:r>
+                          <m:r>
+                            <a:rPr lang="en-US" i="1">
+                              <a:latin typeface="Cambria Math" panose="02040503050406030204" pitchFamily="18" charset="0"/>
+                            </a:rPr>
+                            <m:t>𝑑</m:t>
+                          </m:r>
+                          <m:d>
+                            <m:dPr>
+                              <m:ctrlPr>
+                                <a:rPr lang="en-US" i="1">
+                                  <a:latin typeface="Cambria Math" panose="02040503050406030204" pitchFamily="18" charset="0"/>
+                                </a:rPr>
+                              </m:ctrlPr>
+                            </m:dPr>
+                            <m:e>
+                              <m:r>
+                                <a:rPr lang="en-US" i="1">
+                                  <a:latin typeface="Cambria Math" panose="02040503050406030204" pitchFamily="18" charset="0"/>
+                                </a:rPr>
+                                <m:t>𝑠</m:t>
+                              </m:r>
+                              <m:r>
+                                <a:rPr lang="en-US" i="1">
+                                  <a:latin typeface="Cambria Math" panose="02040503050406030204" pitchFamily="18" charset="0"/>
+                                </a:rPr>
+                                <m:t>,</m:t>
+                              </m:r>
+                              <m:r>
+                                <a:rPr lang="en-US" i="1">
+                                  <a:latin typeface="Cambria Math" panose="02040503050406030204" pitchFamily="18" charset="0"/>
+                                </a:rPr>
+                                <m:t>𝑠</m:t>
+                              </m:r>
+                              <m:r>
+                                <a:rPr lang="en-US" i="1">
+                                  <a:latin typeface="Cambria Math" panose="02040503050406030204" pitchFamily="18" charset="0"/>
+                                </a:rPr>
+                                <m:t>+1</m:t>
+                              </m:r>
+                            </m:e>
+                          </m:d>
+                        </m:sup>
+                      </m:sSup>
+                      <m:r>
+                        <a:rPr lang="en-US" b="0" i="1" smtClean="0">
+                          <a:latin typeface="Cambria Math" panose="02040503050406030204" pitchFamily="18" charset="0"/>
+                          <a:ea typeface="Cambria Math" panose="02040503050406030204" pitchFamily="18" charset="0"/>
+                        </a:rPr>
+                        <m:t>))</m:t>
+                      </m:r>
+                    </m:oMath>
+                  </m:oMathPara>
+                </a14:m>
+                <a:endParaRPr lang="en-US" i="1" dirty="0" smtClean="0"/>
+              </a:p>
+              <a:p>
+                <a:pPr lvl="1"/>
+                <a:endParaRPr lang="en-US" dirty="0" smtClean="0"/>
+              </a:p>
+              <a:p>
+                <a:pPr lvl="1"/>
+                <a:r>
+                  <a:rPr lang="en-US" dirty="0" smtClean="0"/>
+                  <a:t>Or this can be written as: </a:t>
+                </a:r>
+              </a:p>
+              <a:p>
+                <a:pPr marL="457200" lvl="1" indent="0">
+                  <a:buNone/>
+                </a:pPr>
+                <a14:m>
+                  <m:oMathPara xmlns:m="http://schemas.openxmlformats.org/officeDocument/2006/math">
+                    <m:oMathParaPr>
+                      <m:jc m:val="centerGroup"/>
+                    </m:oMathParaPr>
+                    <m:oMath xmlns:m="http://schemas.openxmlformats.org/officeDocument/2006/math">
+                      <m:sSub>
+                        <m:sSubPr>
+                          <m:ctrlPr>
+                            <a:rPr lang="en-US" i="1">
+                              <a:latin typeface="Cambria Math" panose="02040503050406030204" pitchFamily="18" charset="0"/>
+                              <a:ea typeface="Cambria Math" panose="02040503050406030204" pitchFamily="18" charset="0"/>
+                            </a:rPr>
+                          </m:ctrlPr>
+                        </m:sSubPr>
+                        <m:e>
+                          <m:r>
+                            <a:rPr lang="en-US" i="1">
+                              <a:latin typeface="Cambria Math" panose="02040503050406030204" pitchFamily="18" charset="0"/>
+                              <a:ea typeface="Cambria Math" panose="02040503050406030204" pitchFamily="18" charset="0"/>
+                            </a:rPr>
+                            <m:t>𝜀</m:t>
+                          </m:r>
+                        </m:e>
+                        <m:sub>
+                          <m:r>
+                            <a:rPr lang="en-US" i="1">
+                              <a:latin typeface="Cambria Math" panose="02040503050406030204" pitchFamily="18" charset="0"/>
+                              <a:ea typeface="Cambria Math" panose="02040503050406030204" pitchFamily="18" charset="0"/>
+                            </a:rPr>
+                            <m:t>𝑠</m:t>
+                          </m:r>
+                          <m:r>
+                            <a:rPr lang="en-US" i="1">
+                              <a:latin typeface="Cambria Math" panose="02040503050406030204" pitchFamily="18" charset="0"/>
+                              <a:ea typeface="Cambria Math" panose="02040503050406030204" pitchFamily="18" charset="0"/>
+                            </a:rPr>
+                            <m:t>+1</m:t>
+                          </m:r>
+                        </m:sub>
+                      </m:sSub>
+                      <m:r>
+                        <a:rPr lang="en-US" i="1">
+                          <a:latin typeface="Cambria Math" panose="02040503050406030204" pitchFamily="18" charset="0"/>
+                          <a:ea typeface="Cambria Math" panose="02040503050406030204" pitchFamily="18" charset="0"/>
+                        </a:rPr>
+                        <m:t>~</m:t>
+                      </m:r>
+                      <m:r>
+                        <a:rPr lang="en-US" i="1">
+                          <a:latin typeface="Cambria Math" panose="02040503050406030204" pitchFamily="18" charset="0"/>
+                          <a:ea typeface="Cambria Math" panose="02040503050406030204" pitchFamily="18" charset="0"/>
+                        </a:rPr>
+                        <m:t>𝑁𝑜𝑟𝑚𝑎𝑙</m:t>
+                      </m:r>
+                      <m:r>
+                        <a:rPr lang="en-US" i="1">
+                          <a:latin typeface="Cambria Math" panose="02040503050406030204" pitchFamily="18" charset="0"/>
+                          <a:ea typeface="Cambria Math" panose="02040503050406030204" pitchFamily="18" charset="0"/>
+                        </a:rPr>
+                        <m:t>(</m:t>
+                      </m:r>
+                      <m:sSup>
+                        <m:sSupPr>
+                          <m:ctrlPr>
+                            <a:rPr lang="en-US" i="1">
+                              <a:latin typeface="Cambria Math" panose="02040503050406030204" pitchFamily="18" charset="0"/>
+                              <a:ea typeface="Cambria Math" panose="02040503050406030204" pitchFamily="18" charset="0"/>
+                            </a:rPr>
+                          </m:ctrlPr>
+                        </m:sSupPr>
+                        <m:e>
+                          <m:r>
+                            <a:rPr lang="en-US" b="0" i="1" smtClean="0">
+                              <a:latin typeface="Cambria Math" panose="02040503050406030204" pitchFamily="18" charset="0"/>
+                              <a:ea typeface="Cambria Math" panose="02040503050406030204" pitchFamily="18" charset="0"/>
+                            </a:rPr>
+                            <m:t>𝑒</m:t>
+                          </m:r>
+                        </m:e>
+                        <m:sup>
+                          <m:r>
+                            <a:rPr lang="en-US" b="0" i="0" smtClean="0">
+                              <a:latin typeface="Cambria Math" panose="02040503050406030204" pitchFamily="18" charset="0"/>
+                              <a:ea typeface="Cambria Math" panose="02040503050406030204" pitchFamily="18" charset="0"/>
+                            </a:rPr>
+                            <m:t>−</m:t>
+                          </m:r>
+                          <m:r>
+                            <m:rPr>
+                              <m:sty m:val="p"/>
+                            </m:rPr>
+                            <a:rPr lang="el-GR" b="0" i="1" smtClean="0">
+                              <a:latin typeface="Cambria Math" panose="02040503050406030204" pitchFamily="18" charset="0"/>
+                              <a:ea typeface="Cambria Math" panose="02040503050406030204" pitchFamily="18" charset="0"/>
+                            </a:rPr>
+                            <m:t>λ</m:t>
+                          </m:r>
+                          <m:r>
+                            <a:rPr lang="en-US" i="1">
+                              <a:latin typeface="Cambria Math" panose="02040503050406030204" pitchFamily="18" charset="0"/>
+                            </a:rPr>
+                            <m:t>𝑑</m:t>
+                          </m:r>
+                          <m:d>
+                            <m:dPr>
+                              <m:ctrlPr>
+                                <a:rPr lang="en-US" i="1">
+                                  <a:latin typeface="Cambria Math" panose="02040503050406030204" pitchFamily="18" charset="0"/>
+                                </a:rPr>
+                              </m:ctrlPr>
+                            </m:dPr>
+                            <m:e>
+                              <m:r>
+                                <a:rPr lang="en-US" i="1">
+                                  <a:latin typeface="Cambria Math" panose="02040503050406030204" pitchFamily="18" charset="0"/>
+                                </a:rPr>
+                                <m:t>𝑠</m:t>
+                              </m:r>
+                              <m:r>
+                                <a:rPr lang="en-US" i="1">
+                                  <a:latin typeface="Cambria Math" panose="02040503050406030204" pitchFamily="18" charset="0"/>
+                                </a:rPr>
+                                <m:t>,</m:t>
+                              </m:r>
+                              <m:r>
+                                <a:rPr lang="en-US" i="1">
+                                  <a:latin typeface="Cambria Math" panose="02040503050406030204" pitchFamily="18" charset="0"/>
+                                </a:rPr>
+                                <m:t>𝑠</m:t>
+                              </m:r>
+                              <m:r>
+                                <a:rPr lang="en-US" i="1">
+                                  <a:latin typeface="Cambria Math" panose="02040503050406030204" pitchFamily="18" charset="0"/>
+                                </a:rPr>
+                                <m:t>+1</m:t>
+                              </m:r>
+                            </m:e>
+                          </m:d>
+                        </m:sup>
+                      </m:sSup>
+                      <m:sSub>
+                        <m:sSubPr>
+                          <m:ctrlPr>
+                            <a:rPr lang="en-US" i="1">
+                              <a:latin typeface="Cambria Math" panose="02040503050406030204" pitchFamily="18" charset="0"/>
+                              <a:ea typeface="Cambria Math" panose="02040503050406030204" pitchFamily="18" charset="0"/>
+                            </a:rPr>
+                          </m:ctrlPr>
+                        </m:sSubPr>
+                        <m:e>
+                          <m:r>
+                            <a:rPr lang="en-US" i="1">
+                              <a:latin typeface="Cambria Math" panose="02040503050406030204" pitchFamily="18" charset="0"/>
+                              <a:ea typeface="Cambria Math" panose="02040503050406030204" pitchFamily="18" charset="0"/>
+                            </a:rPr>
+                            <m:t>𝜀</m:t>
+                          </m:r>
+                        </m:e>
+                        <m:sub>
+                          <m:r>
+                            <a:rPr lang="en-US" i="1">
+                              <a:latin typeface="Cambria Math" panose="02040503050406030204" pitchFamily="18" charset="0"/>
+                              <a:ea typeface="Cambria Math" panose="02040503050406030204" pitchFamily="18" charset="0"/>
+                            </a:rPr>
+                            <m:t>𝑠</m:t>
+                          </m:r>
+                        </m:sub>
+                      </m:sSub>
+                      <m:r>
+                        <a:rPr lang="en-US" i="1">
+                          <a:latin typeface="Cambria Math" panose="02040503050406030204" pitchFamily="18" charset="0"/>
+                          <a:ea typeface="Cambria Math" panose="02040503050406030204" pitchFamily="18" charset="0"/>
+                        </a:rPr>
+                        <m:t>,</m:t>
+                      </m:r>
+                      <m:sSubSup>
+                        <m:sSubSupPr>
+                          <m:ctrlPr>
+                            <a:rPr lang="en-US" i="1">
+                              <a:latin typeface="Cambria Math" panose="02040503050406030204" pitchFamily="18" charset="0"/>
+                              <a:ea typeface="Cambria Math" panose="02040503050406030204" pitchFamily="18" charset="0"/>
+                            </a:rPr>
+                          </m:ctrlPr>
+                        </m:sSubSupPr>
+                        <m:e>
+                          <m:r>
+                            <a:rPr lang="en-US" i="1">
+                              <a:latin typeface="Cambria Math" panose="02040503050406030204" pitchFamily="18" charset="0"/>
+                              <a:ea typeface="Cambria Math" panose="02040503050406030204" pitchFamily="18" charset="0"/>
+                            </a:rPr>
+                            <m:t>𝜎</m:t>
+                          </m:r>
+                        </m:e>
+                        <m:sub>
+                          <m:r>
+                            <a:rPr lang="en-US" i="1">
+                              <a:latin typeface="Cambria Math" panose="02040503050406030204" pitchFamily="18" charset="0"/>
+                              <a:ea typeface="Cambria Math" panose="02040503050406030204" pitchFamily="18" charset="0"/>
+                            </a:rPr>
+                            <m:t>𝜀</m:t>
+                          </m:r>
+                        </m:sub>
+                        <m:sup>
+                          <m:r>
+                            <a:rPr lang="en-US" i="1">
+                              <a:latin typeface="Cambria Math" panose="02040503050406030204" pitchFamily="18" charset="0"/>
+                              <a:ea typeface="Cambria Math" panose="02040503050406030204" pitchFamily="18" charset="0"/>
+                            </a:rPr>
+                            <m:t>2</m:t>
+                          </m:r>
+                        </m:sup>
+                      </m:sSubSup>
+                      <m:r>
+                        <a:rPr lang="en-US" i="1">
+                          <a:latin typeface="Cambria Math" panose="02040503050406030204" pitchFamily="18" charset="0"/>
+                          <a:ea typeface="Cambria Math" panose="02040503050406030204" pitchFamily="18" charset="0"/>
+                        </a:rPr>
+                        <m:t>(1−</m:t>
+                      </m:r>
+                      <m:sSup>
+                        <m:sSupPr>
+                          <m:ctrlPr>
+                            <a:rPr lang="en-US" i="1">
+                              <a:latin typeface="Cambria Math" panose="02040503050406030204" pitchFamily="18" charset="0"/>
+                              <a:ea typeface="Cambria Math" panose="02040503050406030204" pitchFamily="18" charset="0"/>
+                            </a:rPr>
+                          </m:ctrlPr>
+                        </m:sSupPr>
+                        <m:e>
+                          <m:r>
+                            <a:rPr lang="en-US" b="0" i="1" smtClean="0">
+                              <a:latin typeface="Cambria Math" panose="02040503050406030204" pitchFamily="18" charset="0"/>
+                              <a:ea typeface="Cambria Math" panose="02040503050406030204" pitchFamily="18" charset="0"/>
+                            </a:rPr>
+                            <m:t>𝑒</m:t>
+                          </m:r>
+                        </m:e>
+                        <m:sup>
+                          <m:r>
+                            <a:rPr lang="en-US" b="0" i="1" smtClean="0">
+                              <a:latin typeface="Cambria Math" panose="02040503050406030204" pitchFamily="18" charset="0"/>
+                              <a:ea typeface="Cambria Math" panose="02040503050406030204" pitchFamily="18" charset="0"/>
+                            </a:rPr>
+                            <m:t>−</m:t>
+                          </m:r>
+                          <m:r>
+                            <a:rPr lang="en-US" i="1">
+                              <a:latin typeface="Cambria Math" panose="02040503050406030204" pitchFamily="18" charset="0"/>
+                              <a:ea typeface="Cambria Math" panose="02040503050406030204" pitchFamily="18" charset="0"/>
+                            </a:rPr>
+                            <m:t>2</m:t>
+                          </m:r>
+                          <m:r>
+                            <m:rPr>
+                              <m:sty m:val="p"/>
+                            </m:rPr>
+                            <a:rPr lang="el-GR" i="1">
+                              <a:latin typeface="Cambria Math" panose="02040503050406030204" pitchFamily="18" charset="0"/>
+                              <a:ea typeface="Cambria Math" panose="02040503050406030204" pitchFamily="18" charset="0"/>
+                            </a:rPr>
+                            <m:t>λ</m:t>
+                          </m:r>
+                          <m:r>
+                            <a:rPr lang="en-US" i="1">
+                              <a:latin typeface="Cambria Math" panose="02040503050406030204" pitchFamily="18" charset="0"/>
+                            </a:rPr>
+                            <m:t>𝑑</m:t>
+                          </m:r>
+                          <m:d>
+                            <m:dPr>
+                              <m:ctrlPr>
+                                <a:rPr lang="en-US" i="1">
+                                  <a:latin typeface="Cambria Math" panose="02040503050406030204" pitchFamily="18" charset="0"/>
+                                </a:rPr>
+                              </m:ctrlPr>
+                            </m:dPr>
+                            <m:e>
+                              <m:r>
+                                <a:rPr lang="en-US" i="1">
+                                  <a:latin typeface="Cambria Math" panose="02040503050406030204" pitchFamily="18" charset="0"/>
+                                </a:rPr>
+                                <m:t>𝑠</m:t>
+                              </m:r>
+                              <m:r>
+                                <a:rPr lang="en-US" i="1">
+                                  <a:latin typeface="Cambria Math" panose="02040503050406030204" pitchFamily="18" charset="0"/>
+                                </a:rPr>
+                                <m:t>,</m:t>
+                              </m:r>
+                              <m:r>
+                                <a:rPr lang="en-US" i="1">
+                                  <a:latin typeface="Cambria Math" panose="02040503050406030204" pitchFamily="18" charset="0"/>
+                                </a:rPr>
+                                <m:t>𝑠</m:t>
+                              </m:r>
+                              <m:r>
+                                <a:rPr lang="en-US" i="1">
+                                  <a:latin typeface="Cambria Math" panose="02040503050406030204" pitchFamily="18" charset="0"/>
+                                </a:rPr>
+                                <m:t>+1</m:t>
+                              </m:r>
+                            </m:e>
+                          </m:d>
+                        </m:sup>
+                      </m:sSup>
+                      <m:r>
+                        <a:rPr lang="en-US" i="1">
+                          <a:latin typeface="Cambria Math" panose="02040503050406030204" pitchFamily="18" charset="0"/>
+                          <a:ea typeface="Cambria Math" panose="02040503050406030204" pitchFamily="18" charset="0"/>
+                        </a:rPr>
+                        <m:t>))</m:t>
+                      </m:r>
+                    </m:oMath>
+                  </m:oMathPara>
+                </a14:m>
+                <a:endParaRPr lang="en-US" dirty="0" smtClean="0"/>
+              </a:p>
+              <a:p>
+                <a:pPr lvl="1"/>
+                <a:r>
+                  <a:rPr lang="en-US" dirty="0" smtClean="0"/>
+                  <a:t>Where</a:t>
+                </a:r>
+              </a:p>
+              <a:p>
+                <a:pPr marL="914400" lvl="2" indent="0">
+                  <a:buNone/>
+                </a:pPr>
+                <a14:m>
+                  <m:oMathPara xmlns:m="http://schemas.openxmlformats.org/officeDocument/2006/math">
+                    <m:oMathParaPr>
+                      <m:jc m:val="centerGroup"/>
+                    </m:oMathParaPr>
+                    <m:oMath xmlns:m="http://schemas.openxmlformats.org/officeDocument/2006/math">
+                      <m:r>
+                        <a:rPr lang="en-US" i="1" smtClean="0">
+                          <a:latin typeface="Cambria Math" panose="02040503050406030204" pitchFamily="18" charset="0"/>
+                          <a:ea typeface="Cambria Math" panose="02040503050406030204" pitchFamily="18" charset="0"/>
+                        </a:rPr>
+                        <m:t>𝜆</m:t>
+                      </m:r>
+                      <m:r>
+                        <a:rPr lang="en-US" b="0" i="1" smtClean="0">
+                          <a:latin typeface="Cambria Math" panose="02040503050406030204" pitchFamily="18" charset="0"/>
+                          <a:ea typeface="Cambria Math" panose="02040503050406030204" pitchFamily="18" charset="0"/>
+                        </a:rPr>
+                        <m:t>=−</m:t>
+                      </m:r>
+                      <m:r>
+                        <m:rPr>
+                          <m:sty m:val="p"/>
+                        </m:rPr>
+                        <a:rPr lang="en-US" b="0" i="0" smtClean="0">
+                          <a:latin typeface="Cambria Math" panose="02040503050406030204" pitchFamily="18" charset="0"/>
+                          <a:ea typeface="Cambria Math" panose="02040503050406030204" pitchFamily="18" charset="0"/>
+                        </a:rPr>
+                        <m:t>log</m:t>
+                      </m:r>
+                      <m:r>
+                        <a:rPr lang="en-US" b="0" i="1" smtClean="0">
+                          <a:latin typeface="Cambria Math" panose="02040503050406030204" pitchFamily="18" charset="0"/>
+                          <a:ea typeface="Cambria Math" panose="02040503050406030204" pitchFamily="18" charset="0"/>
+                        </a:rPr>
+                        <m:t>⁡(</m:t>
+                      </m:r>
+                      <m:r>
+                        <a:rPr lang="en-US" b="0" i="1" smtClean="0">
+                          <a:latin typeface="Cambria Math" panose="02040503050406030204" pitchFamily="18" charset="0"/>
+                          <a:ea typeface="Cambria Math" panose="02040503050406030204" pitchFamily="18" charset="0"/>
+                        </a:rPr>
+                        <m:t>𝜌</m:t>
+                      </m:r>
+                      <m:r>
+                        <a:rPr lang="en-US" b="0" i="1" smtClean="0">
+                          <a:latin typeface="Cambria Math" panose="02040503050406030204" pitchFamily="18" charset="0"/>
+                          <a:ea typeface="Cambria Math" panose="02040503050406030204" pitchFamily="18" charset="0"/>
+                        </a:rPr>
+                        <m:t>)</m:t>
+                      </m:r>
+                    </m:oMath>
+                  </m:oMathPara>
+                </a14:m>
+                <a:endParaRPr lang="en-US" dirty="0"/>
+              </a:p>
+              <a:p>
+                <a:pPr lvl="1"/>
+                <a:r>
+                  <a:rPr lang="en-US" dirty="0" smtClean="0"/>
+                  <a:t>Which shows that it is an exponential covariance function…</a:t>
+                </a:r>
+                <a:endParaRPr lang="en-US" dirty="0"/>
+              </a:p>
+              <a:p>
+                <a:pPr marL="0" indent="0">
+                  <a:buNone/>
+                </a:pPr>
+                <a:endParaRPr lang="en-GB" dirty="0"/>
+              </a:p>
+            </p:txBody>
+          </p:sp>
+        </mc:Choice>
+        <mc:Fallback>
+          <p:sp>
+            <p:nvSpPr>
+              <p:cNvPr id="3" name="Content Placeholder 2"/>
+              <p:cNvSpPr>
+                <a:spLocks noGrp="1" noRot="1" noChangeAspect="1" noMove="1" noResize="1" noEditPoints="1" noAdjustHandles="1" noChangeArrowheads="1" noChangeShapeType="1" noTextEdit="1"/>
+              </p:cNvSpPr>
+              <p:nvPr>
+                <p:ph idx="1"/>
+              </p:nvPr>
+            </p:nvSpPr>
+            <p:spPr>
+              <a:blipFill>
+                <a:blip r:embed="rId2"/>
+                <a:stretch>
+                  <a:fillRect l="-1424" t="-1026"/>
+                </a:stretch>
+              </a:blipFill>
+            </p:spPr>
+            <p:txBody>
+              <a:bodyPr/>
+              <a:lstStyle/>
+              <a:p>
+                <a:r>
+                  <a:rPr lang="en-GB">
+                    <a:noFill/>
+                  </a:rPr>
+                  <a:t> </a:t>
+                </a:r>
+              </a:p>
+            </p:txBody>
+          </p:sp>
+        </mc:Fallback>
+      </mc:AlternateContent>
+    </p:spTree>
+    <p:extLst>
+      <p:ext uri="{BB962C8B-B14F-4D97-AF65-F5344CB8AC3E}">
+        <p14:creationId xmlns:p14="http://schemas.microsoft.com/office/powerpoint/2010/main" val="1008842840"/>
+      </p:ext>
+    </p:extLst>
+  </p:cSld>
+  <p:clrMapOvr>
+    <a:masterClrMapping/>
+  </p:clrMapOvr>
+  <p:timing>
+    <p:tnLst>
+      <p:par>
+        <p:cTn id="1" dur="indefinite" restart="never" nodeType="tmRoot">
+          <p:childTnLst>
+            <p:seq concurrent="1" nextAc="seek">
+              <p:cTn id="2" dur="indefinite" nodeType="mainSeq">
+                <p:childTnLst>
+                  <p:par>
+                    <p:cTn id="3" fill="hold">
+                      <p:stCondLst>
+                        <p:cond delay="indefinite"/>
+                      </p:stCondLst>
+                      <p:childTnLst>
+                        <p:par>
+                          <p:cTn id="4" fill="hold">
+                            <p:stCondLst>
+                              <p:cond delay="0"/>
+                            </p:stCondLst>
+                            <p:childTnLst>
+                              <p:par>
+                                <p:cTn id="5" presetID="1" presetClass="entr" presetSubtype="0" fill="hold" nodeType="clickEffect">
+                                  <p:stCondLst>
+                                    <p:cond delay="0"/>
+                                  </p:stCondLst>
+                                  <p:childTnLst>
+                                    <p:set>
+                                      <p:cBhvr>
+                                        <p:cTn id="6" dur="1" fill="hold">
+                                          <p:stCondLst>
+                                            <p:cond delay="0"/>
+                                          </p:stCondLst>
+                                        </p:cTn>
+                                        <p:tgtEl>
+                                          <p:spTgt spid="3">
+                                            <p:txEl>
+                                              <p:pRg st="9" end="9"/>
+                                            </p:txEl>
+                                          </p:spTgt>
+                                        </p:tgtEl>
+                                        <p:attrNameLst>
+                                          <p:attrName>style.visibility</p:attrName>
+                                        </p:attrNameLst>
+                                      </p:cBhvr>
+                                      <p:to>
+                                        <p:strVal val="visible"/>
+                                      </p:to>
+                                    </p:set>
+                                  </p:childTnLst>
+                                </p:cTn>
+                              </p:par>
+                            </p:childTnLst>
+                          </p:cTn>
+                        </p:par>
+                      </p:childTnLst>
+                    </p:cTn>
+                  </p:par>
+                </p:childTnLst>
+              </p:cTn>
+              <p:prevCondLst>
+                <p:cond evt="onPrev" delay="0">
+                  <p:tgtEl>
+                    <p:sldTgt/>
+                  </p:tgtEl>
+                </p:cond>
+              </p:prevCondLst>
+              <p:nextCondLst>
+                <p:cond evt="onNext" delay="0">
+                  <p:tgtEl>
+                    <p:sldTgt/>
+                  </p:tgtEl>
+                </p:cond>
+              </p:nextCondLst>
+            </p:seq>
+          </p:childTnLst>
+        </p:cTn>
+      </p:par>
+    </p:tnLst>
+  </p:timing>
+</p:sld>
+</file>
+
+<file path=ppt/slides/slide8.xml><?xml version="1.0" encoding="utf-8"?>
 <p:sld xmlns:a="http://schemas.openxmlformats.org/drawingml/2006/main" xmlns:r="http://schemas.openxmlformats.org/officeDocument/2006/relationships" xmlns:p="http://schemas.openxmlformats.org/presentationml/2006/main">
   <p:cSld>
     <p:spTree>
@@ -8929,23 +10931,27 @@
             <a:graphicFrameLocks noChangeAspect="1"/>
           </p:cNvGraphicFramePr>
           <p:nvPr>
-            <p:extLst/>
+            <p:extLst>
+              <p:ext uri="{D42A27DB-BD31-4B8C-83A1-F6EECF244321}">
+                <p14:modId xmlns:p14="http://schemas.microsoft.com/office/powerpoint/2010/main" val="962606476"/>
+              </p:ext>
+            </p:extLst>
           </p:nvPr>
         </p:nvGraphicFramePr>
         <p:xfrm>
-          <a:off x="1438745" y="3940175"/>
-          <a:ext cx="5889625" cy="2136775"/>
+          <a:off x="1595438" y="3940175"/>
+          <a:ext cx="5575300" cy="2136775"/>
         </p:xfrm>
         <a:graphic>
           <a:graphicData uri="http://schemas.openxmlformats.org/presentationml/2006/ole">
             <mc:AlternateContent xmlns:mc="http://schemas.openxmlformats.org/markup-compatibility/2006">
               <mc:Choice xmlns:v="urn:schemas-microsoft-com:vml" Requires="v">
-                <p:oleObj spid="_x0000_s8208" name="Equation" r:id="rId4" imgW="3568680" imgH="1295280" progId="Equation.DSMT4">
+                <p:oleObj spid="_x0000_s8213" name="Equation" r:id="rId4" imgW="3377880" imgH="1295280" progId="Equation.DSMT4">
                   <p:embed/>
                 </p:oleObj>
               </mc:Choice>
               <mc:Fallback>
-                <p:oleObj name="Equation" r:id="rId4" imgW="3568680" imgH="1295280" progId="Equation.DSMT4">
+                <p:oleObj name="Equation" r:id="rId4" imgW="3377880" imgH="1295280" progId="Equation.DSMT4">
                   <p:embed/>
                   <p:pic>
                     <p:nvPicPr>
@@ -8961,8 +10967,8 @@
                     </p:blipFill>
                     <p:spPr>
                       <a:xfrm>
-                        <a:off x="1438745" y="3940175"/>
-                        <a:ext cx="5889625" cy="2136775"/>
+                        <a:off x="1595438" y="3940175"/>
+                        <a:ext cx="5575300" cy="2136775"/>
                       </a:xfrm>
                       <a:prstGeom prst="rect">
                         <a:avLst/>
@@ -8995,7 +11001,7 @@
 </p:sld>
 </file>
 
-<file path=ppt/slides/slide7.xml><?xml version="1.0" encoding="utf-8"?>
+<file path=ppt/slides/slide9.xml><?xml version="1.0" encoding="utf-8"?>
 <p:sld xmlns:a="http://schemas.openxmlformats.org/drawingml/2006/main" xmlns:r="http://schemas.openxmlformats.org/officeDocument/2006/relationships" xmlns:p="http://schemas.openxmlformats.org/presentationml/2006/main">
   <p:cSld>
     <p:spTree>
@@ -10328,234 +12334,6 @@
             </p:seq>
           </p:childTnLst>
         </p:cTn>
-      </p:par>
-    </p:tnLst>
-  </p:timing>
-</p:sld>
-</file>
-
-<file path=ppt/slides/slide8.xml><?xml version="1.0" encoding="utf-8"?>
-<p:sld xmlns:a="http://schemas.openxmlformats.org/drawingml/2006/main" xmlns:r="http://schemas.openxmlformats.org/officeDocument/2006/relationships" xmlns:p="http://schemas.openxmlformats.org/presentationml/2006/main">
-  <p:cSld>
-    <p:spTree>
-      <p:nvGrpSpPr>
-        <p:cNvPr id="1" name=""/>
-        <p:cNvGrpSpPr/>
-        <p:nvPr/>
-      </p:nvGrpSpPr>
-      <p:grpSpPr>
-        <a:xfrm>
-          <a:off x="0" y="0"/>
-          <a:ext cx="0" cy="0"/>
-          <a:chOff x="0" y="0"/>
-          <a:chExt cx="0" cy="0"/>
-        </a:xfrm>
-      </p:grpSpPr>
-      <p:sp>
-        <p:nvSpPr>
-          <p:cNvPr id="2" name="Title 1"/>
-          <p:cNvSpPr>
-            <a:spLocks noGrp="1"/>
-          </p:cNvSpPr>
-          <p:nvPr>
-            <p:ph type="title"/>
-          </p:nvPr>
-        </p:nvSpPr>
-        <p:spPr/>
-        <p:txBody>
-          <a:bodyPr/>
-          <a:lstStyle/>
-          <a:p>
-            <a:endParaRPr lang="en-GB"/>
-          </a:p>
-        </p:txBody>
-      </p:sp>
-      <p:sp>
-        <p:nvSpPr>
-          <p:cNvPr id="3" name="Content Placeholder 2"/>
-          <p:cNvSpPr>
-            <a:spLocks noGrp="1"/>
-          </p:cNvSpPr>
-          <p:nvPr>
-            <p:ph idx="1"/>
-          </p:nvPr>
-        </p:nvSpPr>
-        <p:spPr/>
-        <p:txBody>
-          <a:bodyPr/>
-          <a:lstStyle/>
-          <a:p>
-            <a:pPr marL="0" indent="0">
-              <a:buNone/>
-            </a:pPr>
-            <a:endParaRPr lang="en-US" dirty="0" smtClean="0"/>
-          </a:p>
-          <a:p>
-            <a:pPr marL="0" indent="0">
-              <a:buNone/>
-            </a:pPr>
-            <a:endParaRPr lang="en-US" dirty="0"/>
-          </a:p>
-          <a:p>
-            <a:pPr marL="0" indent="0" algn="ctr">
-              <a:buNone/>
-            </a:pPr>
-            <a:endParaRPr lang="en-US" dirty="0" smtClean="0"/>
-          </a:p>
-          <a:p>
-            <a:pPr marL="0" indent="0" algn="ctr">
-              <a:buNone/>
-            </a:pPr>
-            <a:endParaRPr lang="en-US" dirty="0"/>
-          </a:p>
-          <a:p>
-            <a:pPr marL="0" indent="0" algn="ctr">
-              <a:buNone/>
-            </a:pPr>
-            <a:r>
-              <a:rPr lang="en-US" dirty="0" smtClean="0"/>
-              <a:t>[Show R and TMB code for 2 ways to code this]</a:t>
-            </a:r>
-            <a:endParaRPr lang="en-GB" dirty="0"/>
-          </a:p>
-        </p:txBody>
-      </p:sp>
-    </p:spTree>
-    <p:extLst>
-      <p:ext uri="{BB962C8B-B14F-4D97-AF65-F5344CB8AC3E}">
-        <p14:creationId xmlns:p14="http://schemas.microsoft.com/office/powerpoint/2010/main" val="2953693310"/>
-      </p:ext>
-    </p:extLst>
-  </p:cSld>
-  <p:clrMapOvr>
-    <a:masterClrMapping/>
-  </p:clrMapOvr>
-  <p:timing>
-    <p:tnLst>
-      <p:par>
-        <p:cTn id="1" dur="indefinite" restart="never" nodeType="tmRoot"/>
-      </p:par>
-    </p:tnLst>
-  </p:timing>
-</p:sld>
-</file>
-
-<file path=ppt/slides/slide9.xml><?xml version="1.0" encoding="utf-8"?>
-<p:sld xmlns:a="http://schemas.openxmlformats.org/drawingml/2006/main" xmlns:r="http://schemas.openxmlformats.org/officeDocument/2006/relationships" xmlns:p="http://schemas.openxmlformats.org/presentationml/2006/main">
-  <p:cSld>
-    <p:spTree>
-      <p:nvGrpSpPr>
-        <p:cNvPr id="1" name=""/>
-        <p:cNvGrpSpPr/>
-        <p:nvPr/>
-      </p:nvGrpSpPr>
-      <p:grpSpPr>
-        <a:xfrm>
-          <a:off x="0" y="0"/>
-          <a:ext cx="0" cy="0"/>
-          <a:chOff x="0" y="0"/>
-          <a:chExt cx="0" cy="0"/>
-        </a:xfrm>
-      </p:grpSpPr>
-      <p:sp>
-        <p:nvSpPr>
-          <p:cNvPr id="2" name="Title 1"/>
-          <p:cNvSpPr>
-            <a:spLocks noGrp="1"/>
-          </p:cNvSpPr>
-          <p:nvPr>
-            <p:ph type="title"/>
-          </p:nvPr>
-        </p:nvSpPr>
-        <p:spPr/>
-        <p:txBody>
-          <a:bodyPr/>
-          <a:lstStyle/>
-          <a:p>
-            <a:endParaRPr lang="en-GB"/>
-          </a:p>
-        </p:txBody>
-      </p:sp>
-      <p:sp>
-        <p:nvSpPr>
-          <p:cNvPr id="3" name="Content Placeholder 2"/>
-          <p:cNvSpPr>
-            <a:spLocks noGrp="1"/>
-          </p:cNvSpPr>
-          <p:nvPr>
-            <p:ph idx="1"/>
-          </p:nvPr>
-        </p:nvSpPr>
-        <p:spPr/>
-        <p:txBody>
-          <a:bodyPr/>
-          <a:lstStyle/>
-          <a:p>
-            <a:pPr marL="0" indent="0">
-              <a:buNone/>
-            </a:pPr>
-            <a:r>
-              <a:rPr lang="en-US" dirty="0" smtClean="0"/>
-              <a:t>Lessons:</a:t>
-            </a:r>
-          </a:p>
-          <a:p>
-            <a:pPr marL="514350" indent="-514350">
-              <a:buFont typeface="+mj-lt"/>
-              <a:buAutoNum type="arabicPeriod"/>
-            </a:pPr>
-            <a:r>
-              <a:rPr lang="en-US" dirty="0" smtClean="0"/>
-              <a:t>Speed</a:t>
-            </a:r>
-          </a:p>
-          <a:p>
-            <a:pPr lvl="1" indent="-342900"/>
-            <a:r>
-              <a:rPr lang="en-US" dirty="0" smtClean="0"/>
-              <a:t>Again, stochastic is easier than covariance-based calculation</a:t>
-            </a:r>
-          </a:p>
-          <a:p>
-            <a:pPr lvl="1" indent="-342900"/>
-            <a:r>
-              <a:rPr lang="en-US" dirty="0" smtClean="0"/>
-              <a:t>Avoids need to assemble covariance matrix</a:t>
-            </a:r>
-          </a:p>
-          <a:p>
-            <a:pPr marL="514350" indent="-514350">
-              <a:buFont typeface="+mj-lt"/>
-              <a:buAutoNum type="arabicPeriod"/>
-            </a:pPr>
-            <a:r>
-              <a:rPr lang="en-US" dirty="0" smtClean="0"/>
-              <a:t>Unequal-interval models generalize the equal-interval models</a:t>
-            </a:r>
-          </a:p>
-          <a:p>
-            <a:pPr lvl="1" indent="-342900"/>
-            <a:r>
-              <a:rPr lang="en-US" dirty="0" smtClean="0"/>
-              <a:t>Generally true that continuous treatment generalizes discrete treatment</a:t>
-            </a:r>
-          </a:p>
-        </p:txBody>
-      </p:sp>
-    </p:spTree>
-    <p:extLst>
-      <p:ext uri="{BB962C8B-B14F-4D97-AF65-F5344CB8AC3E}">
-        <p14:creationId xmlns:p14="http://schemas.microsoft.com/office/powerpoint/2010/main" val="2197743423"/>
-      </p:ext>
-    </p:extLst>
-  </p:cSld>
-  <p:clrMapOvr>
-    <a:masterClrMapping/>
-  </p:clrMapOvr>
-  <p:timing>
-    <p:tnLst>
-      <p:par>
-        <p:cTn id="1" dur="indefinite" restart="never" nodeType="tmRoot"/>
       </p:par>
     </p:tnLst>
   </p:timing>

</xml_diff>

<commit_message>
adding Week 6 materials
</commit_message>
<xml_diff>
--- a/Week 5 -- 1D spatial models/Lab/Lab 5 -- 1D spatial models with unequal distances.pptx
+++ b/Week 5 -- 1D spatial models/Lab/Lab 5 -- 1D spatial models with unequal distances.pptx
@@ -5,25 +5,24 @@
     <p:sldMasterId id="2147483672" r:id="rId1"/>
   </p:sldMasterIdLst>
   <p:notesMasterIdLst>
-    <p:notesMasterId r:id="rId18"/>
+    <p:notesMasterId r:id="rId17"/>
   </p:notesMasterIdLst>
   <p:sldIdLst>
     <p:sldId id="266" r:id="rId2"/>
     <p:sldId id="321" r:id="rId3"/>
     <p:sldId id="324" r:id="rId4"/>
-    <p:sldId id="311" r:id="rId5"/>
-    <p:sldId id="317" r:id="rId6"/>
-    <p:sldId id="312" r:id="rId7"/>
-    <p:sldId id="325" r:id="rId8"/>
-    <p:sldId id="313" r:id="rId9"/>
-    <p:sldId id="314" r:id="rId10"/>
-    <p:sldId id="315" r:id="rId11"/>
-    <p:sldId id="316" r:id="rId12"/>
-    <p:sldId id="323" r:id="rId13"/>
-    <p:sldId id="318" r:id="rId14"/>
-    <p:sldId id="319" r:id="rId15"/>
-    <p:sldId id="322" r:id="rId16"/>
-    <p:sldId id="320" r:id="rId17"/>
+    <p:sldId id="317" r:id="rId5"/>
+    <p:sldId id="312" r:id="rId6"/>
+    <p:sldId id="325" r:id="rId7"/>
+    <p:sldId id="313" r:id="rId8"/>
+    <p:sldId id="314" r:id="rId9"/>
+    <p:sldId id="315" r:id="rId10"/>
+    <p:sldId id="316" r:id="rId11"/>
+    <p:sldId id="323" r:id="rId12"/>
+    <p:sldId id="318" r:id="rId13"/>
+    <p:sldId id="319" r:id="rId14"/>
+    <p:sldId id="322" r:id="rId15"/>
+    <p:sldId id="320" r:id="rId16"/>
   </p:sldIdLst>
   <p:sldSz cx="9144000" cy="6858000" type="screen4x3"/>
   <p:notesSz cx="6858000" cy="9144000"/>
@@ -3584,42 +3583,59 @@
             <a:pPr marL="0" indent="0">
               <a:buNone/>
             </a:pPr>
-            <a:endParaRPr lang="en-US" dirty="0" smtClean="0"/>
-          </a:p>
-          <a:p>
-            <a:pPr marL="0" indent="0">
-              <a:buNone/>
-            </a:pPr>
-            <a:endParaRPr lang="en-US" dirty="0"/>
-          </a:p>
-          <a:p>
-            <a:pPr marL="0" indent="0" algn="ctr">
-              <a:buNone/>
-            </a:pPr>
-            <a:endParaRPr lang="en-US" dirty="0" smtClean="0"/>
-          </a:p>
-          <a:p>
-            <a:pPr marL="0" indent="0" algn="ctr">
-              <a:buNone/>
-            </a:pPr>
-            <a:endParaRPr lang="en-US" dirty="0"/>
-          </a:p>
-          <a:p>
-            <a:pPr marL="0" indent="0" algn="ctr">
-              <a:buNone/>
+            <a:r>
+              <a:rPr lang="en-US" dirty="0" smtClean="0"/>
+              <a:t>Lessons:</a:t>
+            </a:r>
+          </a:p>
+          <a:p>
+            <a:pPr marL="514350" indent="-514350">
+              <a:buFont typeface="+mj-lt"/>
+              <a:buAutoNum type="arabicPeriod"/>
             </a:pPr>
             <a:r>
               <a:rPr lang="en-US" dirty="0" smtClean="0"/>
-              <a:t>[Show R and TMB code for 2 ways to code this]</a:t>
+              <a:t>Speed</a:t>
             </a:r>
-            <a:endParaRPr lang="en-GB" dirty="0"/>
+          </a:p>
+          <a:p>
+            <a:pPr lvl="1" indent="-342900"/>
+            <a:r>
+              <a:rPr lang="en-US" dirty="0" smtClean="0"/>
+              <a:t>Again, stochastic is easier than covariance-based calculation</a:t>
+            </a:r>
+          </a:p>
+          <a:p>
+            <a:pPr lvl="1" indent="-342900"/>
+            <a:r>
+              <a:rPr lang="en-US" dirty="0" smtClean="0"/>
+              <a:t>Stochastic correctly detects sparse structure of hessian matrix, although both are technically a “separable model”</a:t>
+            </a:r>
+            <a:endParaRPr lang="en-US" dirty="0" smtClean="0"/>
+          </a:p>
+          <a:p>
+            <a:pPr marL="514350" indent="-514350">
+              <a:buFont typeface="+mj-lt"/>
+              <a:buAutoNum type="arabicPeriod"/>
+            </a:pPr>
+            <a:r>
+              <a:rPr lang="en-US" dirty="0" smtClean="0"/>
+              <a:t>Unequal-interval models generalize the equal-interval models</a:t>
+            </a:r>
+          </a:p>
+          <a:p>
+            <a:pPr lvl="1" indent="-342900"/>
+            <a:r>
+              <a:rPr lang="en-US" dirty="0" smtClean="0"/>
+              <a:t>Generally true that continuous treatment generalizes discrete treatment</a:t>
+            </a:r>
           </a:p>
         </p:txBody>
       </p:sp>
     </p:spTree>
     <p:extLst>
       <p:ext uri="{BB962C8B-B14F-4D97-AF65-F5344CB8AC3E}">
-        <p14:creationId xmlns:p14="http://schemas.microsoft.com/office/powerpoint/2010/main" val="2953693310"/>
+        <p14:creationId xmlns:p14="http://schemas.microsoft.com/office/powerpoint/2010/main" val="2197743423"/>
       </p:ext>
     </p:extLst>
   </p:cSld>
@@ -3692,128 +3708,6 @@
             </a:pPr>
             <a:r>
               <a:rPr lang="en-US" dirty="0" smtClean="0"/>
-              <a:t>Lessons:</a:t>
-            </a:r>
-          </a:p>
-          <a:p>
-            <a:pPr marL="514350" indent="-514350">
-              <a:buFont typeface="+mj-lt"/>
-              <a:buAutoNum type="arabicPeriod"/>
-            </a:pPr>
-            <a:r>
-              <a:rPr lang="en-US" dirty="0" smtClean="0"/>
-              <a:t>Speed</a:t>
-            </a:r>
-          </a:p>
-          <a:p>
-            <a:pPr lvl="1" indent="-342900"/>
-            <a:r>
-              <a:rPr lang="en-US" dirty="0" smtClean="0"/>
-              <a:t>Again, stochastic is easier than covariance-based calculation</a:t>
-            </a:r>
-          </a:p>
-          <a:p>
-            <a:pPr lvl="1" indent="-342900"/>
-            <a:r>
-              <a:rPr lang="en-US" dirty="0" smtClean="0"/>
-              <a:t>Avoids need to assemble covariance matrix</a:t>
-            </a:r>
-          </a:p>
-          <a:p>
-            <a:pPr marL="514350" indent="-514350">
-              <a:buFont typeface="+mj-lt"/>
-              <a:buAutoNum type="arabicPeriod"/>
-            </a:pPr>
-            <a:r>
-              <a:rPr lang="en-US" dirty="0" smtClean="0"/>
-              <a:t>Unequal-interval models generalize the equal-interval models</a:t>
-            </a:r>
-          </a:p>
-          <a:p>
-            <a:pPr lvl="1" indent="-342900"/>
-            <a:r>
-              <a:rPr lang="en-US" dirty="0" smtClean="0"/>
-              <a:t>Generally true that continuous treatment generalizes discrete treatment</a:t>
-            </a:r>
-          </a:p>
-        </p:txBody>
-      </p:sp>
-    </p:spTree>
-    <p:extLst>
-      <p:ext uri="{BB962C8B-B14F-4D97-AF65-F5344CB8AC3E}">
-        <p14:creationId xmlns:p14="http://schemas.microsoft.com/office/powerpoint/2010/main" val="2197743423"/>
-      </p:ext>
-    </p:extLst>
-  </p:cSld>
-  <p:clrMapOvr>
-    <a:masterClrMapping/>
-  </p:clrMapOvr>
-  <p:timing>
-    <p:tnLst>
-      <p:par>
-        <p:cTn id="1" dur="indefinite" restart="never" nodeType="tmRoot"/>
-      </p:par>
-    </p:tnLst>
-  </p:timing>
-</p:sld>
-</file>
-
-<file path=ppt/slides/slide12.xml><?xml version="1.0" encoding="utf-8"?>
-<p:sld xmlns:a="http://schemas.openxmlformats.org/drawingml/2006/main" xmlns:r="http://schemas.openxmlformats.org/officeDocument/2006/relationships" xmlns:p="http://schemas.openxmlformats.org/presentationml/2006/main">
-  <p:cSld>
-    <p:spTree>
-      <p:nvGrpSpPr>
-        <p:cNvPr id="1" name=""/>
-        <p:cNvGrpSpPr/>
-        <p:nvPr/>
-      </p:nvGrpSpPr>
-      <p:grpSpPr>
-        <a:xfrm>
-          <a:off x="0" y="0"/>
-          <a:ext cx="0" cy="0"/>
-          <a:chOff x="0" y="0"/>
-          <a:chExt cx="0" cy="0"/>
-        </a:xfrm>
-      </p:grpSpPr>
-      <p:sp>
-        <p:nvSpPr>
-          <p:cNvPr id="2" name="Title 1"/>
-          <p:cNvSpPr>
-            <a:spLocks noGrp="1"/>
-          </p:cNvSpPr>
-          <p:nvPr>
-            <p:ph type="title"/>
-          </p:nvPr>
-        </p:nvSpPr>
-        <p:spPr/>
-        <p:txBody>
-          <a:bodyPr/>
-          <a:lstStyle/>
-          <a:p>
-            <a:endParaRPr lang="en-GB"/>
-          </a:p>
-        </p:txBody>
-      </p:sp>
-      <p:sp>
-        <p:nvSpPr>
-          <p:cNvPr id="3" name="Content Placeholder 2"/>
-          <p:cNvSpPr>
-            <a:spLocks noGrp="1"/>
-          </p:cNvSpPr>
-          <p:nvPr>
-            <p:ph idx="1"/>
-          </p:nvPr>
-        </p:nvSpPr>
-        <p:spPr/>
-        <p:txBody>
-          <a:bodyPr/>
-          <a:lstStyle/>
-          <a:p>
-            <a:pPr marL="0" indent="0">
-              <a:buNone/>
-            </a:pPr>
-            <a:r>
-              <a:rPr lang="en-US" dirty="0" smtClean="0"/>
               <a:t>When else does </a:t>
             </a:r>
             <a:r>
@@ -3843,7 +3737,6 @@
               <a:rPr lang="en-US" dirty="0" smtClean="0"/>
               <a:t>[Exercise: Compare version 2 for the exponential covariance function with a new covariance function, and inspect the Hessian for each]</a:t>
             </a:r>
-            <a:endParaRPr lang="en-US" dirty="0" smtClean="0"/>
           </a:p>
         </p:txBody>
       </p:sp>
@@ -3867,7 +3760,7 @@
 </p:sld>
 </file>
 
-<file path=ppt/slides/slide13.xml><?xml version="1.0" encoding="utf-8"?>
+<file path=ppt/slides/slide12.xml><?xml version="1.0" encoding="utf-8"?>
 <p:sld xmlns:a="http://schemas.openxmlformats.org/drawingml/2006/main" xmlns:r="http://schemas.openxmlformats.org/officeDocument/2006/relationships" xmlns:p="http://schemas.openxmlformats.org/presentationml/2006/main">
   <p:cSld>
     <p:spTree>
@@ -4435,7 +4328,7 @@
 </p:sld>
 </file>
 
-<file path=ppt/slides/slide14.xml><?xml version="1.0" encoding="utf-8"?>
+<file path=ppt/slides/slide13.xml><?xml version="1.0" encoding="utf-8"?>
 <p:sld xmlns:a="http://schemas.openxmlformats.org/drawingml/2006/main" xmlns:r="http://schemas.openxmlformats.org/officeDocument/2006/relationships" xmlns:p="http://schemas.openxmlformats.org/presentationml/2006/main">
   <p:cSld>
     <p:spTree>
@@ -4996,7 +4889,7 @@
 </p:sld>
 </file>
 
-<file path=ppt/slides/slide15.xml><?xml version="1.0" encoding="utf-8"?>
+<file path=ppt/slides/slide14.xml><?xml version="1.0" encoding="utf-8"?>
 <p:sld xmlns:a="http://schemas.openxmlformats.org/drawingml/2006/main" xmlns:r="http://schemas.openxmlformats.org/officeDocument/2006/relationships" xmlns:p="http://schemas.openxmlformats.org/presentationml/2006/main">
   <p:cSld>
     <p:spTree>
@@ -5750,7 +5643,7 @@
 </p:sld>
 </file>
 
-<file path=ppt/slides/slide16.xml><?xml version="1.0" encoding="utf-8"?>
+<file path=ppt/slides/slide15.xml><?xml version="1.0" encoding="utf-8"?>
 <p:sld xmlns:a="http://schemas.openxmlformats.org/drawingml/2006/main" xmlns:r="http://schemas.openxmlformats.org/officeDocument/2006/relationships" xmlns:p="http://schemas.openxmlformats.org/presentationml/2006/main">
   <p:cSld>
     <p:spTree>
@@ -7362,11 +7255,7 @@
                 </a:r>
                 <a:r>
                   <a:rPr lang="en-US" dirty="0" smtClean="0"/>
-                  <a:t>:  Equal </a:t>
-                </a:r>
-                <a:r>
-                  <a:rPr lang="en-US" dirty="0" smtClean="0"/>
-                  <a:t>distance </a:t>
+                  <a:t>:  Equal distance </a:t>
                 </a:r>
                 <a:r>
                   <a:rPr lang="en-US" dirty="0" err="1" smtClean="0"/>
@@ -7678,7 +7567,42 @@
                           <a:latin typeface="Cambria Math" panose="02040503050406030204" pitchFamily="18" charset="0"/>
                           <a:ea typeface="Cambria Math" panose="02040503050406030204" pitchFamily="18" charset="0"/>
                         </a:rPr>
-                        <m:t>),</m:t>
+                        <m:t>),(1−</m:t>
+                      </m:r>
+                      <m:sSup>
+                        <m:sSupPr>
+                          <m:ctrlPr>
+                            <a:rPr lang="en-US" b="0" i="1" smtClean="0">
+                              <a:latin typeface="Cambria Math" panose="02040503050406030204" pitchFamily="18" charset="0"/>
+                              <a:ea typeface="Cambria Math" panose="02040503050406030204" pitchFamily="18" charset="0"/>
+                            </a:rPr>
+                          </m:ctrlPr>
+                        </m:sSupPr>
+                        <m:e>
+                          <m:r>
+                            <a:rPr lang="en-US" i="1">
+                              <a:latin typeface="Cambria Math" panose="02040503050406030204" pitchFamily="18" charset="0"/>
+                              <a:ea typeface="Cambria Math" panose="02040503050406030204" pitchFamily="18" charset="0"/>
+                            </a:rPr>
+                            <m:t>𝜌</m:t>
+                          </m:r>
+                        </m:e>
+                        <m:sup>
+                          <m:r>
+                            <a:rPr lang="en-US" b="0" i="1" smtClean="0">
+                              <a:latin typeface="Cambria Math" panose="02040503050406030204" pitchFamily="18" charset="0"/>
+                              <a:ea typeface="Cambria Math" panose="02040503050406030204" pitchFamily="18" charset="0"/>
+                            </a:rPr>
+                            <m:t>2</m:t>
+                          </m:r>
+                        </m:sup>
+                      </m:sSup>
+                      <m:r>
+                        <a:rPr lang="en-US" b="0" i="1" smtClean="0">
+                          <a:latin typeface="Cambria Math" panose="02040503050406030204" pitchFamily="18" charset="0"/>
+                          <a:ea typeface="Cambria Math" panose="02040503050406030204" pitchFamily="18" charset="0"/>
+                        </a:rPr>
+                        <m:t>)</m:t>
                       </m:r>
                       <m:sSubSup>
                         <m:sSubSupPr>
@@ -7793,7 +7717,7 @@
         </p:blipFill>
         <p:spPr>
           <a:xfrm>
-            <a:off x="2355495" y="3468054"/>
+            <a:off x="2191594" y="3433053"/>
             <a:ext cx="4184293" cy="3210724"/>
           </a:xfrm>
           <a:prstGeom prst="rect">
@@ -7889,94 +7813,6 @@
           </a:p>
         </p:txBody>
       </p:sp>
-    </p:spTree>
-    <p:extLst>
-      <p:ext uri="{BB962C8B-B14F-4D97-AF65-F5344CB8AC3E}">
-        <p14:creationId xmlns:p14="http://schemas.microsoft.com/office/powerpoint/2010/main" val="4187002983"/>
-      </p:ext>
-    </p:extLst>
-  </p:cSld>
-  <p:clrMapOvr>
-    <a:masterClrMapping/>
-  </p:clrMapOvr>
-  <p:timing>
-    <p:tnLst>
-      <p:par>
-        <p:cTn id="1" dur="indefinite" restart="never" nodeType="tmRoot"/>
-      </p:par>
-    </p:tnLst>
-  </p:timing>
-</p:sld>
-</file>
-
-<file path=ppt/slides/slide5.xml><?xml version="1.0" encoding="utf-8"?>
-<p:sld xmlns:a="http://schemas.openxmlformats.org/drawingml/2006/main" xmlns:r="http://schemas.openxmlformats.org/officeDocument/2006/relationships" xmlns:p="http://schemas.openxmlformats.org/presentationml/2006/main">
-  <p:cSld>
-    <p:spTree>
-      <p:nvGrpSpPr>
-        <p:cNvPr id="1" name=""/>
-        <p:cNvGrpSpPr/>
-        <p:nvPr/>
-      </p:nvGrpSpPr>
-      <p:grpSpPr>
-        <a:xfrm>
-          <a:off x="0" y="0"/>
-          <a:ext cx="0" cy="0"/>
-          <a:chOff x="0" y="0"/>
-          <a:chExt cx="0" cy="0"/>
-        </a:xfrm>
-      </p:grpSpPr>
-      <p:sp>
-        <p:nvSpPr>
-          <p:cNvPr id="2" name="Title 1"/>
-          <p:cNvSpPr>
-            <a:spLocks noGrp="1"/>
-          </p:cNvSpPr>
-          <p:nvPr>
-            <p:ph type="title"/>
-          </p:nvPr>
-        </p:nvSpPr>
-        <p:spPr/>
-        <p:txBody>
-          <a:bodyPr/>
-          <a:lstStyle/>
-          <a:p>
-            <a:endParaRPr lang="en-GB"/>
-          </a:p>
-        </p:txBody>
-      </p:sp>
-      <p:sp>
-        <p:nvSpPr>
-          <p:cNvPr id="3" name="Content Placeholder 2"/>
-          <p:cNvSpPr>
-            <a:spLocks noGrp="1"/>
-          </p:cNvSpPr>
-          <p:nvPr>
-            <p:ph idx="1"/>
-          </p:nvPr>
-        </p:nvSpPr>
-        <p:spPr/>
-        <p:txBody>
-          <a:bodyPr/>
-          <a:lstStyle/>
-          <a:p>
-            <a:pPr marL="0" indent="0">
-              <a:buNone/>
-            </a:pPr>
-            <a:r>
-              <a:rPr lang="en-US" dirty="0" smtClean="0"/>
-              <a:t>What if you want to model unequal distances?</a:t>
-            </a:r>
-            <a:endParaRPr lang="en-GB" dirty="0"/>
-          </a:p>
-          <a:p>
-            <a:pPr marL="0" indent="0">
-              <a:buNone/>
-            </a:pPr>
-            <a:endParaRPr lang="en-US" dirty="0"/>
-          </a:p>
-        </p:txBody>
-      </p:sp>
       <p:pic>
         <p:nvPicPr>
           <p:cNvPr id="5" name="Picture 4"/>
@@ -8026,7 +7862,7 @@
 </p:sld>
 </file>
 
-<file path=ppt/slides/slide6.xml><?xml version="1.0" encoding="utf-8"?>
+<file path=ppt/slides/slide5.xml><?xml version="1.0" encoding="utf-8"?>
 <p:sld xmlns:a="http://schemas.openxmlformats.org/drawingml/2006/main" xmlns:r="http://schemas.openxmlformats.org/officeDocument/2006/relationships" xmlns:p="http://schemas.openxmlformats.org/presentationml/2006/main">
   <p:cSld>
     <p:spTree>
@@ -8062,8 +7898,8 @@
           </a:p>
         </p:txBody>
       </p:sp>
-      <mc:AlternateContent xmlns:mc="http://schemas.openxmlformats.org/markup-compatibility/2006">
-        <mc:Choice xmlns:a14="http://schemas.microsoft.com/office/drawing/2010/main" Requires="a14">
+      <mc:AlternateContent xmlns:mc="http://schemas.openxmlformats.org/markup-compatibility/2006" xmlns:a14="http://schemas.microsoft.com/office/drawing/2010/main">
+        <mc:Choice Requires="a14">
           <p:sp>
             <p:nvSpPr>
               <p:cNvPr id="3" name="Content Placeholder 2"/>
@@ -8748,11 +8584,7 @@
                 <a:pPr lvl="1"/>
                 <a:r>
                   <a:rPr lang="en-US" dirty="0" smtClean="0"/>
-                  <a:t>Review </a:t>
-                </a:r>
-                <a:r>
-                  <a:rPr lang="en-US" dirty="0" smtClean="0"/>
-                  <a:t>properties:</a:t>
+                  <a:t>Review properties:</a:t>
                 </a:r>
               </a:p>
               <a:p>
@@ -9355,7 +9187,7 @@
             </p:txBody>
           </p:sp>
         </mc:Choice>
-        <mc:Fallback>
+        <mc:Fallback xmlns="">
           <p:sp>
             <p:nvSpPr>
               <p:cNvPr id="3" name="Content Placeholder 2"/>
@@ -9409,7 +9241,7 @@
 </p:sld>
 </file>
 
-<file path=ppt/slides/slide7.xml><?xml version="1.0" encoding="utf-8"?>
+<file path=ppt/slides/slide6.xml><?xml version="1.0" encoding="utf-8"?>
 <p:sld xmlns:a="http://schemas.openxmlformats.org/drawingml/2006/main" xmlns:r="http://schemas.openxmlformats.org/officeDocument/2006/relationships" xmlns:p="http://schemas.openxmlformats.org/presentationml/2006/main">
   <p:cSld>
     <p:spTree>
@@ -9445,8 +9277,8 @@
           </a:p>
         </p:txBody>
       </p:sp>
-      <mc:AlternateContent xmlns:mc="http://schemas.openxmlformats.org/markup-compatibility/2006">
-        <mc:Choice xmlns:a14="http://schemas.microsoft.com/office/drawing/2010/main" Requires="a14">
+      <mc:AlternateContent xmlns:mc="http://schemas.openxmlformats.org/markup-compatibility/2006" xmlns:a14="http://schemas.microsoft.com/office/drawing/2010/main">
+        <mc:Choice Requires="a14">
           <p:sp>
             <p:nvSpPr>
               <p:cNvPr id="3" name="Content Placeholder 2"/>
@@ -10394,7 +10226,7 @@
             </p:txBody>
           </p:sp>
         </mc:Choice>
-        <mc:Fallback>
+        <mc:Fallback xmlns="">
           <p:sp>
             <p:nvSpPr>
               <p:cNvPr id="3" name="Content Placeholder 2"/>
@@ -10520,7 +10352,7 @@
 </p:sld>
 </file>
 
-<file path=ppt/slides/slide8.xml><?xml version="1.0" encoding="utf-8"?>
+<file path=ppt/slides/slide7.xml><?xml version="1.0" encoding="utf-8"?>
 <p:sld xmlns:a="http://schemas.openxmlformats.org/drawingml/2006/main" xmlns:r="http://schemas.openxmlformats.org/officeDocument/2006/relationships" xmlns:p="http://schemas.openxmlformats.org/presentationml/2006/main">
   <p:cSld>
     <p:spTree>
@@ -10946,7 +10778,7 @@
           <a:graphicData uri="http://schemas.openxmlformats.org/presentationml/2006/ole">
             <mc:AlternateContent xmlns:mc="http://schemas.openxmlformats.org/markup-compatibility/2006">
               <mc:Choice xmlns:v="urn:schemas-microsoft-com:vml" Requires="v">
-                <p:oleObj spid="_x0000_s8213" name="Equation" r:id="rId4" imgW="3377880" imgH="1295280" progId="Equation.DSMT4">
+                <p:oleObj spid="_x0000_s8215" name="Equation" r:id="rId4" imgW="3377880" imgH="1295280" progId="Equation.DSMT4">
                   <p:embed/>
                 </p:oleObj>
               </mc:Choice>
@@ -11001,7 +10833,7 @@
 </p:sld>
 </file>
 
-<file path=ppt/slides/slide9.xml><?xml version="1.0" encoding="utf-8"?>
+<file path=ppt/slides/slide8.xml><?xml version="1.0" encoding="utf-8"?>
 <p:sld xmlns:a="http://schemas.openxmlformats.org/drawingml/2006/main" xmlns:r="http://schemas.openxmlformats.org/officeDocument/2006/relationships" xmlns:p="http://schemas.openxmlformats.org/presentationml/2006/main">
   <p:cSld>
     <p:spTree>
@@ -12334,6 +12166,112 @@
             </p:seq>
           </p:childTnLst>
         </p:cTn>
+      </p:par>
+    </p:tnLst>
+  </p:timing>
+</p:sld>
+</file>
+
+<file path=ppt/slides/slide9.xml><?xml version="1.0" encoding="utf-8"?>
+<p:sld xmlns:a="http://schemas.openxmlformats.org/drawingml/2006/main" xmlns:r="http://schemas.openxmlformats.org/officeDocument/2006/relationships" xmlns:p="http://schemas.openxmlformats.org/presentationml/2006/main">
+  <p:cSld>
+    <p:spTree>
+      <p:nvGrpSpPr>
+        <p:cNvPr id="1" name=""/>
+        <p:cNvGrpSpPr/>
+        <p:nvPr/>
+      </p:nvGrpSpPr>
+      <p:grpSpPr>
+        <a:xfrm>
+          <a:off x="0" y="0"/>
+          <a:ext cx="0" cy="0"/>
+          <a:chOff x="0" y="0"/>
+          <a:chExt cx="0" cy="0"/>
+        </a:xfrm>
+      </p:grpSpPr>
+      <p:sp>
+        <p:nvSpPr>
+          <p:cNvPr id="2" name="Title 1"/>
+          <p:cNvSpPr>
+            <a:spLocks noGrp="1"/>
+          </p:cNvSpPr>
+          <p:nvPr>
+            <p:ph type="title"/>
+          </p:nvPr>
+        </p:nvSpPr>
+        <p:spPr/>
+        <p:txBody>
+          <a:bodyPr/>
+          <a:lstStyle/>
+          <a:p>
+            <a:endParaRPr lang="en-GB"/>
+          </a:p>
+        </p:txBody>
+      </p:sp>
+      <p:sp>
+        <p:nvSpPr>
+          <p:cNvPr id="3" name="Content Placeholder 2"/>
+          <p:cNvSpPr>
+            <a:spLocks noGrp="1"/>
+          </p:cNvSpPr>
+          <p:nvPr>
+            <p:ph idx="1"/>
+          </p:nvPr>
+        </p:nvSpPr>
+        <p:spPr/>
+        <p:txBody>
+          <a:bodyPr/>
+          <a:lstStyle/>
+          <a:p>
+            <a:pPr marL="0" indent="0">
+              <a:buNone/>
+            </a:pPr>
+            <a:endParaRPr lang="en-US" dirty="0" smtClean="0"/>
+          </a:p>
+          <a:p>
+            <a:pPr marL="0" indent="0">
+              <a:buNone/>
+            </a:pPr>
+            <a:endParaRPr lang="en-US" dirty="0"/>
+          </a:p>
+          <a:p>
+            <a:pPr marL="0" indent="0" algn="ctr">
+              <a:buNone/>
+            </a:pPr>
+            <a:endParaRPr lang="en-US" dirty="0" smtClean="0"/>
+          </a:p>
+          <a:p>
+            <a:pPr marL="0" indent="0" algn="ctr">
+              <a:buNone/>
+            </a:pPr>
+            <a:endParaRPr lang="en-US" dirty="0"/>
+          </a:p>
+          <a:p>
+            <a:pPr marL="0" indent="0" algn="ctr">
+              <a:buNone/>
+            </a:pPr>
+            <a:r>
+              <a:rPr lang="en-US" dirty="0" smtClean="0"/>
+              <a:t>[Show R and TMB code for 2 ways to code this]</a:t>
+            </a:r>
+            <a:endParaRPr lang="en-GB" dirty="0"/>
+          </a:p>
+        </p:txBody>
+      </p:sp>
+    </p:spTree>
+    <p:extLst>
+      <p:ext uri="{BB962C8B-B14F-4D97-AF65-F5344CB8AC3E}">
+        <p14:creationId xmlns:p14="http://schemas.microsoft.com/office/powerpoint/2010/main" val="2953693310"/>
+      </p:ext>
+    </p:extLst>
+  </p:cSld>
+  <p:clrMapOvr>
+    <a:masterClrMapping/>
+  </p:clrMapOvr>
+  <p:timing>
+    <p:tnLst>
+      <p:par>
+        <p:cTn id="1" dur="indefinite" restart="never" nodeType="tmRoot"/>
       </p:par>
     </p:tnLst>
   </p:timing>

</xml_diff>